<commit_message>
Updated Presentation for W9-S2
</commit_message>
<xml_diff>
--- a/week-9/W9-S2-Style-and-State/W9-S2-Style-and-State.pptx
+++ b/week-9/W9-S2-Style-and-State/W9-S2-Style-and-State.pptx
@@ -5,25 +5,23 @@
     <p:sldMasterId id="2147483968" r:id="rId1"/>
   </p:sldMasterIdLst>
   <p:notesMasterIdLst>
-    <p:notesMasterId r:id="rId15"/>
+    <p:notesMasterId r:id="rId13"/>
   </p:notesMasterIdLst>
   <p:handoutMasterIdLst>
-    <p:handoutMasterId r:id="rId16"/>
+    <p:handoutMasterId r:id="rId14"/>
   </p:handoutMasterIdLst>
   <p:sldIdLst>
     <p:sldId id="256" r:id="rId2"/>
     <p:sldId id="258" r:id="rId3"/>
     <p:sldId id="259" r:id="rId4"/>
-    <p:sldId id="294" r:id="rId5"/>
-    <p:sldId id="295" r:id="rId6"/>
-    <p:sldId id="296" r:id="rId7"/>
-    <p:sldId id="287" r:id="rId8"/>
-    <p:sldId id="269" r:id="rId9"/>
-    <p:sldId id="288" r:id="rId10"/>
-    <p:sldId id="289" r:id="rId11"/>
-    <p:sldId id="290" r:id="rId12"/>
-    <p:sldId id="292" r:id="rId13"/>
-    <p:sldId id="264" r:id="rId14"/>
+    <p:sldId id="297" r:id="rId5"/>
+    <p:sldId id="298" r:id="rId6"/>
+    <p:sldId id="299" r:id="rId7"/>
+    <p:sldId id="294" r:id="rId8"/>
+    <p:sldId id="295" r:id="rId9"/>
+    <p:sldId id="296" r:id="rId10"/>
+    <p:sldId id="292" r:id="rId11"/>
+    <p:sldId id="264" r:id="rId12"/>
   </p:sldIdLst>
   <p:sldSz cx="12192000" cy="6858000"/>
   <p:notesSz cx="6858000" cy="9144000"/>
@@ -130,14 +128,12 @@
             <p14:sldId id="256"/>
             <p14:sldId id="258"/>
             <p14:sldId id="259"/>
+            <p14:sldId id="297"/>
+            <p14:sldId id="298"/>
+            <p14:sldId id="299"/>
             <p14:sldId id="294"/>
             <p14:sldId id="295"/>
             <p14:sldId id="296"/>
-            <p14:sldId id="287"/>
-            <p14:sldId id="269"/>
-            <p14:sldId id="288"/>
-            <p14:sldId id="289"/>
-            <p14:sldId id="290"/>
             <p14:sldId id="292"/>
             <p14:sldId id="264"/>
           </p14:sldIdLst>
@@ -451,7 +447,7 @@
           <a:p>
             <a:fld id="{AA884A5F-B9F5-9B43-BE5B-EBBCD5646595}" type="datetimeFigureOut">
               <a:rPr lang="en-US" smtClean="0"/>
-              <a:t>10/8/24</a:t>
+              <a:t>11/10/24</a:t>
             </a:fld>
             <a:endParaRPr lang="en-US"/>
           </a:p>
@@ -811,6 +807,330 @@
         <p:cNvPr id="1" name="">
           <a:extLst>
             <a:ext uri="{FF2B5EF4-FFF2-40B4-BE49-F238E27FC236}">
+              <a16:creationId xmlns:a16="http://schemas.microsoft.com/office/drawing/2014/main" id="{C75E3410-588A-391F-4C63-6869E50A379A}"/>
+            </a:ext>
+          </a:extLst>
+        </p:cNvPr>
+        <p:cNvGrpSpPr/>
+        <p:nvPr/>
+      </p:nvGrpSpPr>
+      <p:grpSpPr>
+        <a:xfrm>
+          <a:off x="0" y="0"/>
+          <a:ext cx="0" cy="0"/>
+          <a:chOff x="0" y="0"/>
+          <a:chExt cx="0" cy="0"/>
+        </a:xfrm>
+      </p:grpSpPr>
+      <p:sp>
+        <p:nvSpPr>
+          <p:cNvPr id="2" name="Slide Image Placeholder 1">
+            <a:extLst>
+              <a:ext uri="{FF2B5EF4-FFF2-40B4-BE49-F238E27FC236}">
+                <a16:creationId xmlns:a16="http://schemas.microsoft.com/office/drawing/2014/main" id="{9B29B73E-F231-7E20-A30A-8D87CC35FC92}"/>
+              </a:ext>
+            </a:extLst>
+          </p:cNvPr>
+          <p:cNvSpPr>
+            <a:spLocks noGrp="1" noRot="1" noChangeAspect="1"/>
+          </p:cNvSpPr>
+          <p:nvPr>
+            <p:ph type="sldImg"/>
+          </p:nvPr>
+        </p:nvSpPr>
+        <p:spPr/>
+      </p:sp>
+      <p:sp>
+        <p:nvSpPr>
+          <p:cNvPr id="3" name="Notes Placeholder 2">
+            <a:extLst>
+              <a:ext uri="{FF2B5EF4-FFF2-40B4-BE49-F238E27FC236}">
+                <a16:creationId xmlns:a16="http://schemas.microsoft.com/office/drawing/2014/main" id="{D2D663FF-143E-455C-52D6-88375786FB30}"/>
+              </a:ext>
+            </a:extLst>
+          </p:cNvPr>
+          <p:cNvSpPr>
+            <a:spLocks noGrp="1"/>
+          </p:cNvSpPr>
+          <p:nvPr>
+            <p:ph type="body" idx="1"/>
+          </p:nvPr>
+        </p:nvSpPr>
+        <p:spPr/>
+        <p:txBody>
+          <a:bodyPr/>
+          <a:lstStyle/>
+          <a:p>
+            <a:endParaRPr lang="en-US"/>
+          </a:p>
+        </p:txBody>
+      </p:sp>
+      <p:sp>
+        <p:nvSpPr>
+          <p:cNvPr id="4" name="Slide Number Placeholder 3">
+            <a:extLst>
+              <a:ext uri="{FF2B5EF4-FFF2-40B4-BE49-F238E27FC236}">
+                <a16:creationId xmlns:a16="http://schemas.microsoft.com/office/drawing/2014/main" id="{29DE8BF7-4412-0381-197D-B95C7DB37813}"/>
+              </a:ext>
+            </a:extLst>
+          </p:cNvPr>
+          <p:cNvSpPr>
+            <a:spLocks noGrp="1"/>
+          </p:cNvSpPr>
+          <p:nvPr>
+            <p:ph type="sldNum" sz="quarter" idx="5"/>
+          </p:nvPr>
+        </p:nvSpPr>
+        <p:spPr/>
+        <p:txBody>
+          <a:bodyPr/>
+          <a:lstStyle/>
+          <a:p>
+            <a:fld id="{F091FFD5-F11F-1A49-B4BA-FB7EDA4EBC19}" type="slidenum">
+              <a:rPr lang="en-US" smtClean="0"/>
+              <a:t>4</a:t>
+            </a:fld>
+            <a:endParaRPr lang="en-US"/>
+          </a:p>
+        </p:txBody>
+      </p:sp>
+    </p:spTree>
+    <p:extLst>
+      <p:ext uri="{BB962C8B-B14F-4D97-AF65-F5344CB8AC3E}">
+        <p14:creationId xmlns:p14="http://schemas.microsoft.com/office/powerpoint/2010/main" val="2858578651"/>
+      </p:ext>
+    </p:extLst>
+  </p:cSld>
+  <p:clrMapOvr>
+    <a:masterClrMapping/>
+  </p:clrMapOvr>
+</p:notes>
+</file>
+
+<file path=ppt/notesSlides/notesSlide3.xml><?xml version="1.0" encoding="utf-8"?>
+<p:notes xmlns:a="http://schemas.openxmlformats.org/drawingml/2006/main" xmlns:r="http://schemas.openxmlformats.org/officeDocument/2006/relationships" xmlns:p="http://schemas.openxmlformats.org/presentationml/2006/main">
+  <p:cSld>
+    <p:spTree>
+      <p:nvGrpSpPr>
+        <p:cNvPr id="1" name="">
+          <a:extLst>
+            <a:ext uri="{FF2B5EF4-FFF2-40B4-BE49-F238E27FC236}">
+              <a16:creationId xmlns:a16="http://schemas.microsoft.com/office/drawing/2014/main" id="{E946307A-28A0-C170-26B6-5E2E78A3D258}"/>
+            </a:ext>
+          </a:extLst>
+        </p:cNvPr>
+        <p:cNvGrpSpPr/>
+        <p:nvPr/>
+      </p:nvGrpSpPr>
+      <p:grpSpPr>
+        <a:xfrm>
+          <a:off x="0" y="0"/>
+          <a:ext cx="0" cy="0"/>
+          <a:chOff x="0" y="0"/>
+          <a:chExt cx="0" cy="0"/>
+        </a:xfrm>
+      </p:grpSpPr>
+      <p:sp>
+        <p:nvSpPr>
+          <p:cNvPr id="2" name="Slide Image Placeholder 1">
+            <a:extLst>
+              <a:ext uri="{FF2B5EF4-FFF2-40B4-BE49-F238E27FC236}">
+                <a16:creationId xmlns:a16="http://schemas.microsoft.com/office/drawing/2014/main" id="{061EF71A-F8D6-E5C4-27BB-7428FB062459}"/>
+              </a:ext>
+            </a:extLst>
+          </p:cNvPr>
+          <p:cNvSpPr>
+            <a:spLocks noGrp="1" noRot="1" noChangeAspect="1"/>
+          </p:cNvSpPr>
+          <p:nvPr>
+            <p:ph type="sldImg"/>
+          </p:nvPr>
+        </p:nvSpPr>
+        <p:spPr/>
+      </p:sp>
+      <p:sp>
+        <p:nvSpPr>
+          <p:cNvPr id="3" name="Notes Placeholder 2">
+            <a:extLst>
+              <a:ext uri="{FF2B5EF4-FFF2-40B4-BE49-F238E27FC236}">
+                <a16:creationId xmlns:a16="http://schemas.microsoft.com/office/drawing/2014/main" id="{515B086D-F8AF-ED84-9483-1E7EF007988C}"/>
+              </a:ext>
+            </a:extLst>
+          </p:cNvPr>
+          <p:cNvSpPr>
+            <a:spLocks noGrp="1"/>
+          </p:cNvSpPr>
+          <p:nvPr>
+            <p:ph type="body" idx="1"/>
+          </p:nvPr>
+        </p:nvSpPr>
+        <p:spPr/>
+        <p:txBody>
+          <a:bodyPr/>
+          <a:lstStyle/>
+          <a:p>
+            <a:endParaRPr lang="en-US"/>
+          </a:p>
+        </p:txBody>
+      </p:sp>
+      <p:sp>
+        <p:nvSpPr>
+          <p:cNvPr id="4" name="Slide Number Placeholder 3">
+            <a:extLst>
+              <a:ext uri="{FF2B5EF4-FFF2-40B4-BE49-F238E27FC236}">
+                <a16:creationId xmlns:a16="http://schemas.microsoft.com/office/drawing/2014/main" id="{F3182BF9-B987-5486-668A-A825A5CA95CE}"/>
+              </a:ext>
+            </a:extLst>
+          </p:cNvPr>
+          <p:cNvSpPr>
+            <a:spLocks noGrp="1"/>
+          </p:cNvSpPr>
+          <p:nvPr>
+            <p:ph type="sldNum" sz="quarter" idx="5"/>
+          </p:nvPr>
+        </p:nvSpPr>
+        <p:spPr/>
+        <p:txBody>
+          <a:bodyPr/>
+          <a:lstStyle/>
+          <a:p>
+            <a:fld id="{F091FFD5-F11F-1A49-B4BA-FB7EDA4EBC19}" type="slidenum">
+              <a:rPr lang="en-US" smtClean="0"/>
+              <a:t>5</a:t>
+            </a:fld>
+            <a:endParaRPr lang="en-US"/>
+          </a:p>
+        </p:txBody>
+      </p:sp>
+    </p:spTree>
+    <p:extLst>
+      <p:ext uri="{BB962C8B-B14F-4D97-AF65-F5344CB8AC3E}">
+        <p14:creationId xmlns:p14="http://schemas.microsoft.com/office/powerpoint/2010/main" val="1922596811"/>
+      </p:ext>
+    </p:extLst>
+  </p:cSld>
+  <p:clrMapOvr>
+    <a:masterClrMapping/>
+  </p:clrMapOvr>
+</p:notes>
+</file>
+
+<file path=ppt/notesSlides/notesSlide4.xml><?xml version="1.0" encoding="utf-8"?>
+<p:notes xmlns:a="http://schemas.openxmlformats.org/drawingml/2006/main" xmlns:r="http://schemas.openxmlformats.org/officeDocument/2006/relationships" xmlns:p="http://schemas.openxmlformats.org/presentationml/2006/main">
+  <p:cSld>
+    <p:spTree>
+      <p:nvGrpSpPr>
+        <p:cNvPr id="1" name="">
+          <a:extLst>
+            <a:ext uri="{FF2B5EF4-FFF2-40B4-BE49-F238E27FC236}">
+              <a16:creationId xmlns:a16="http://schemas.microsoft.com/office/drawing/2014/main" id="{2A65685E-E3AE-32E0-8252-41FFEC27A3E0}"/>
+            </a:ext>
+          </a:extLst>
+        </p:cNvPr>
+        <p:cNvGrpSpPr/>
+        <p:nvPr/>
+      </p:nvGrpSpPr>
+      <p:grpSpPr>
+        <a:xfrm>
+          <a:off x="0" y="0"/>
+          <a:ext cx="0" cy="0"/>
+          <a:chOff x="0" y="0"/>
+          <a:chExt cx="0" cy="0"/>
+        </a:xfrm>
+      </p:grpSpPr>
+      <p:sp>
+        <p:nvSpPr>
+          <p:cNvPr id="2" name="Slide Image Placeholder 1">
+            <a:extLst>
+              <a:ext uri="{FF2B5EF4-FFF2-40B4-BE49-F238E27FC236}">
+                <a16:creationId xmlns:a16="http://schemas.microsoft.com/office/drawing/2014/main" id="{A95979B5-BCD0-6277-B2FD-C59D78A72FE1}"/>
+              </a:ext>
+            </a:extLst>
+          </p:cNvPr>
+          <p:cNvSpPr>
+            <a:spLocks noGrp="1" noRot="1" noChangeAspect="1"/>
+          </p:cNvSpPr>
+          <p:nvPr>
+            <p:ph type="sldImg"/>
+          </p:nvPr>
+        </p:nvSpPr>
+        <p:spPr/>
+      </p:sp>
+      <p:sp>
+        <p:nvSpPr>
+          <p:cNvPr id="3" name="Notes Placeholder 2">
+            <a:extLst>
+              <a:ext uri="{FF2B5EF4-FFF2-40B4-BE49-F238E27FC236}">
+                <a16:creationId xmlns:a16="http://schemas.microsoft.com/office/drawing/2014/main" id="{B04ED12B-B3FC-8349-F192-2E0A8C056087}"/>
+              </a:ext>
+            </a:extLst>
+          </p:cNvPr>
+          <p:cNvSpPr>
+            <a:spLocks noGrp="1"/>
+          </p:cNvSpPr>
+          <p:nvPr>
+            <p:ph type="body" idx="1"/>
+          </p:nvPr>
+        </p:nvSpPr>
+        <p:spPr/>
+        <p:txBody>
+          <a:bodyPr/>
+          <a:lstStyle/>
+          <a:p>
+            <a:endParaRPr lang="en-US"/>
+          </a:p>
+        </p:txBody>
+      </p:sp>
+      <p:sp>
+        <p:nvSpPr>
+          <p:cNvPr id="4" name="Slide Number Placeholder 3">
+            <a:extLst>
+              <a:ext uri="{FF2B5EF4-FFF2-40B4-BE49-F238E27FC236}">
+                <a16:creationId xmlns:a16="http://schemas.microsoft.com/office/drawing/2014/main" id="{D2E12143-D422-5A15-014C-1487DF9DE36A}"/>
+              </a:ext>
+            </a:extLst>
+          </p:cNvPr>
+          <p:cNvSpPr>
+            <a:spLocks noGrp="1"/>
+          </p:cNvSpPr>
+          <p:nvPr>
+            <p:ph type="sldNum" sz="quarter" idx="5"/>
+          </p:nvPr>
+        </p:nvSpPr>
+        <p:spPr/>
+        <p:txBody>
+          <a:bodyPr/>
+          <a:lstStyle/>
+          <a:p>
+            <a:fld id="{F091FFD5-F11F-1A49-B4BA-FB7EDA4EBC19}" type="slidenum">
+              <a:rPr lang="en-US" smtClean="0"/>
+              <a:t>6</a:t>
+            </a:fld>
+            <a:endParaRPr lang="en-US"/>
+          </a:p>
+        </p:txBody>
+      </p:sp>
+    </p:spTree>
+    <p:extLst>
+      <p:ext uri="{BB962C8B-B14F-4D97-AF65-F5344CB8AC3E}">
+        <p14:creationId xmlns:p14="http://schemas.microsoft.com/office/powerpoint/2010/main" val="688088676"/>
+      </p:ext>
+    </p:extLst>
+  </p:cSld>
+  <p:clrMapOvr>
+    <a:masterClrMapping/>
+  </p:clrMapOvr>
+</p:notes>
+</file>
+
+<file path=ppt/notesSlides/notesSlide5.xml><?xml version="1.0" encoding="utf-8"?>
+<p:notes xmlns:a="http://schemas.openxmlformats.org/drawingml/2006/main" xmlns:r="http://schemas.openxmlformats.org/officeDocument/2006/relationships" xmlns:p="http://schemas.openxmlformats.org/presentationml/2006/main">
+  <p:cSld>
+    <p:spTree>
+      <p:nvGrpSpPr>
+        <p:cNvPr id="1" name="">
+          <a:extLst>
+            <a:ext uri="{FF2B5EF4-FFF2-40B4-BE49-F238E27FC236}">
               <a16:creationId xmlns:a16="http://schemas.microsoft.com/office/drawing/2014/main" id="{E3FF5544-6753-F0D9-26E4-7993702C93FB}"/>
             </a:ext>
           </a:extLst>
@@ -892,7 +1212,7 @@
           <a:p>
             <a:fld id="{F091FFD5-F11F-1A49-B4BA-FB7EDA4EBC19}" type="slidenum">
               <a:rPr lang="en-US" smtClean="0"/>
-              <a:t>4</a:t>
+              <a:t>7</a:t>
             </a:fld>
             <a:endParaRPr lang="en-US"/>
           </a:p>
@@ -911,7 +1231,7 @@
 </p:notes>
 </file>
 
-<file path=ppt/notesSlides/notesSlide3.xml><?xml version="1.0" encoding="utf-8"?>
+<file path=ppt/notesSlides/notesSlide6.xml><?xml version="1.0" encoding="utf-8"?>
 <p:notes xmlns:a="http://schemas.openxmlformats.org/drawingml/2006/main" xmlns:r="http://schemas.openxmlformats.org/officeDocument/2006/relationships" xmlns:p="http://schemas.openxmlformats.org/presentationml/2006/main">
   <p:cSld>
     <p:spTree>
@@ -1000,7 +1320,7 @@
           <a:p>
             <a:fld id="{F091FFD5-F11F-1A49-B4BA-FB7EDA4EBC19}" type="slidenum">
               <a:rPr lang="en-US" smtClean="0"/>
-              <a:t>5</a:t>
+              <a:t>8</a:t>
             </a:fld>
             <a:endParaRPr lang="en-US"/>
           </a:p>
@@ -1019,7 +1339,7 @@
 </p:notes>
 </file>
 
-<file path=ppt/notesSlides/notesSlide4.xml><?xml version="1.0" encoding="utf-8"?>
+<file path=ppt/notesSlides/notesSlide7.xml><?xml version="1.0" encoding="utf-8"?>
 <p:notes xmlns:a="http://schemas.openxmlformats.org/drawingml/2006/main" xmlns:r="http://schemas.openxmlformats.org/officeDocument/2006/relationships" xmlns:p="http://schemas.openxmlformats.org/presentationml/2006/main">
   <p:cSld>
     <p:spTree>
@@ -1108,7 +1428,7 @@
           <a:p>
             <a:fld id="{F091FFD5-F11F-1A49-B4BA-FB7EDA4EBC19}" type="slidenum">
               <a:rPr lang="en-US" smtClean="0"/>
-              <a:t>6</a:t>
+              <a:t>9</a:t>
             </a:fld>
             <a:endParaRPr lang="en-US"/>
           </a:p>
@@ -1372,7 +1692,7 @@
           <a:p>
             <a:fld id="{F6FA2B21-3FCD-4721-B95C-427943F61125}" type="datetime1">
               <a:rPr lang="en-US" smtClean="0"/>
-              <a:t>10/8/24</a:t>
+              <a:t>11/10/24</a:t>
             </a:fld>
             <a:endParaRPr lang="en-US"/>
           </a:p>
@@ -1635,7 +1955,7 @@
           <a:p>
             <a:fld id="{F6FA2B21-3FCD-4721-B95C-427943F61125}" type="datetime1">
               <a:rPr lang="en-US" smtClean="0"/>
-              <a:t>10/8/24</a:t>
+              <a:t>11/10/24</a:t>
             </a:fld>
             <a:endParaRPr lang="en-US"/>
           </a:p>
@@ -1871,7 +2191,7 @@
           <a:p>
             <a:fld id="{F6FA2B21-3FCD-4721-B95C-427943F61125}" type="datetime1">
               <a:rPr lang="en-US" smtClean="0"/>
-              <a:t>10/8/24</a:t>
+              <a:t>11/10/24</a:t>
             </a:fld>
             <a:endParaRPr lang="en-US"/>
           </a:p>
@@ -2199,7 +2519,7 @@
           <a:p>
             <a:fld id="{EA0C0817-A112-4847-8014-A94B7D2A4EA3}" type="datetime1">
               <a:rPr lang="en-US" smtClean="0"/>
-              <a:t>10/8/24</a:t>
+              <a:t>11/10/24</a:t>
             </a:fld>
             <a:endParaRPr lang="en-US" dirty="0"/>
           </a:p>
@@ -2513,7 +2833,7 @@
           <a:p>
             <a:fld id="{7332B432-ACDA-4023-A761-2BAB76577B62}" type="datetime1">
               <a:rPr lang="en-US" smtClean="0"/>
-              <a:t>10/8/24</a:t>
+              <a:t>11/10/24</a:t>
             </a:fld>
             <a:endParaRPr lang="en-US"/>
           </a:p>
@@ -2820,7 +3140,7 @@
           <a:p>
             <a:fld id="{D9C646AA-F36E-4540-911D-FFFC0A0EF24A}" type="datetime1">
               <a:rPr lang="en-US" smtClean="0"/>
-              <a:t>10/8/24</a:t>
+              <a:t>11/10/24</a:t>
             </a:fld>
             <a:endParaRPr lang="en-US" dirty="0"/>
           </a:p>
@@ -3122,7 +3442,7 @@
           <a:p>
             <a:fld id="{69186D26-FA5F-4637-B602-B7C2DC34CFD4}" type="datetime1">
               <a:rPr lang="en-US" smtClean="0"/>
-              <a:t>10/8/24</a:t>
+              <a:t>11/10/24</a:t>
             </a:fld>
             <a:endParaRPr lang="en-US"/>
           </a:p>
@@ -3544,7 +3864,7 @@
           <a:p>
             <a:fld id="{8A7F15D8-96D1-4781-BC50-CA8A088B2FE4}" type="datetime1">
               <a:rPr lang="en-US" smtClean="0"/>
-              <a:t>10/8/24</a:t>
+              <a:t>11/10/24</a:t>
             </a:fld>
             <a:endParaRPr lang="en-US"/>
           </a:p>
@@ -3706,7 +4026,7 @@
           <a:p>
             <a:fld id="{F9A96C99-B8F8-4528-BD05-0E16E943DC09}" type="datetime1">
               <a:rPr lang="en-US" smtClean="0"/>
-              <a:t>10/8/24</a:t>
+              <a:t>11/10/24</a:t>
             </a:fld>
             <a:endParaRPr lang="en-US"/>
           </a:p>
@@ -3801,7 +4121,7 @@
           <a:p>
             <a:fld id="{03636942-C211-4B28-8DBD-C953E00AF71B}" type="datetime1">
               <a:rPr lang="en-US" smtClean="0"/>
-              <a:t>10/8/24</a:t>
+              <a:t>11/10/24</a:t>
             </a:fld>
             <a:endParaRPr lang="en-US"/>
           </a:p>
@@ -4179,7 +4499,7 @@
           <a:p>
             <a:fld id="{7E8D12A6-918A-48BD-8CB9-CA713993B0EA}" type="datetime1">
               <a:rPr lang="en-US" smtClean="0"/>
-              <a:t>10/8/24</a:t>
+              <a:t>11/10/24</a:t>
             </a:fld>
             <a:endParaRPr lang="en-US"/>
           </a:p>
@@ -4468,7 +4788,7 @@
           <a:p>
             <a:fld id="{F6FA2B21-3FCD-4721-B95C-427943F61125}" type="datetime1">
               <a:rPr lang="en-US" smtClean="0"/>
-              <a:t>10/8/24</a:t>
+              <a:t>11/10/24</a:t>
             </a:fld>
             <a:endParaRPr lang="en-US"/>
           </a:p>
@@ -4680,7 +5000,7 @@
           <a:p>
             <a:fld id="{F6FA2B21-3FCD-4721-B95C-427943F61125}" type="datetime1">
               <a:rPr lang="en-US" smtClean="0"/>
-              <a:t>10/8/24</a:t>
+              <a:t>11/10/24</a:t>
             </a:fld>
             <a:endParaRPr lang="en-US"/>
           </a:p>
@@ -5384,7 +5704,7 @@
                   <a:schemeClr val="tx1"/>
                 </a:solidFill>
               </a:rPr>
-              <a:t>HTTP and 3rd Party APIs</a:t>
+              <a:t>React Style and State</a:t>
             </a:r>
             <a:endParaRPr lang="en-US" sz="4000" dirty="0">
               <a:solidFill>
@@ -5448,355 +5768,6 @@
 </file>
 
 <file path=ppt/slides/slide10.xml><?xml version="1.0" encoding="utf-8"?>
-<p:sld xmlns:a="http://schemas.openxmlformats.org/drawingml/2006/main" xmlns:r="http://schemas.openxmlformats.org/officeDocument/2006/relationships" xmlns:p="http://schemas.openxmlformats.org/presentationml/2006/main">
-  <p:cSld>
-    <p:spTree>
-      <p:nvGrpSpPr>
-        <p:cNvPr id="1" name="">
-          <a:extLst>
-            <a:ext uri="{FF2B5EF4-FFF2-40B4-BE49-F238E27FC236}">
-              <a16:creationId xmlns:a16="http://schemas.microsoft.com/office/drawing/2014/main" id="{B4BBCFAD-AB74-790B-C28F-CC6646FE3744}"/>
-            </a:ext>
-          </a:extLst>
-        </p:cNvPr>
-        <p:cNvGrpSpPr/>
-        <p:nvPr/>
-      </p:nvGrpSpPr>
-      <p:grpSpPr>
-        <a:xfrm>
-          <a:off x="0" y="0"/>
-          <a:ext cx="0" cy="0"/>
-          <a:chOff x="0" y="0"/>
-          <a:chExt cx="0" cy="0"/>
-        </a:xfrm>
-      </p:grpSpPr>
-      <p:sp>
-        <p:nvSpPr>
-          <p:cNvPr id="2" name="Title 1">
-            <a:extLst>
-              <a:ext uri="{FF2B5EF4-FFF2-40B4-BE49-F238E27FC236}">
-                <a16:creationId xmlns:a16="http://schemas.microsoft.com/office/drawing/2014/main" id="{0F51729B-E9F3-ED10-8134-49B2A015B911}"/>
-              </a:ext>
-            </a:extLst>
-          </p:cNvPr>
-          <p:cNvSpPr>
-            <a:spLocks noGrp="1"/>
-          </p:cNvSpPr>
-          <p:nvPr>
-            <p:ph type="title"/>
-          </p:nvPr>
-        </p:nvSpPr>
-        <p:spPr>
-          <a:xfrm>
-            <a:off x="581193" y="729658"/>
-            <a:ext cx="11029616" cy="988332"/>
-          </a:xfrm>
-        </p:spPr>
-        <p:txBody>
-          <a:bodyPr anchor="b">
-            <a:normAutofit/>
-          </a:bodyPr>
-          <a:lstStyle/>
-          <a:p>
-            <a:r>
-              <a:rPr lang="en-GB" dirty="0"/>
-              <a:t>Using JSON Data in JavaScript</a:t>
-            </a:r>
-          </a:p>
-        </p:txBody>
-      </p:sp>
-      <p:sp>
-        <p:nvSpPr>
-          <p:cNvPr id="3" name="Content Placeholder 2">
-            <a:extLst>
-              <a:ext uri="{FF2B5EF4-FFF2-40B4-BE49-F238E27FC236}">
-                <a16:creationId xmlns:a16="http://schemas.microsoft.com/office/drawing/2014/main" id="{582D4F13-686A-C501-DCC7-9DE01A2F4267}"/>
-              </a:ext>
-            </a:extLst>
-          </p:cNvPr>
-          <p:cNvSpPr>
-            <a:spLocks noGrp="1"/>
-          </p:cNvSpPr>
-          <p:nvPr>
-            <p:ph sz="half" idx="1"/>
-          </p:nvPr>
-        </p:nvSpPr>
-        <p:spPr>
-          <a:xfrm>
-            <a:off x="581193" y="2228003"/>
-            <a:ext cx="5422390" cy="3633047"/>
-          </a:xfrm>
-        </p:spPr>
-        <p:txBody>
-          <a:bodyPr anchor="ctr">
-            <a:normAutofit/>
-          </a:bodyPr>
-          <a:lstStyle/>
-          <a:p>
-            <a:pPr>
-              <a:buFont typeface="Arial" panose="020B0604020202020204" pitchFamily="34" charset="0"/>
-              <a:buChar char="•"/>
-            </a:pPr>
-            <a:r>
-              <a:rPr lang="en-GB" b="1" dirty="0"/>
-              <a:t>Parsing JSON</a:t>
-            </a:r>
-            <a:r>
-              <a:rPr lang="en-GB" dirty="0"/>
-              <a:t>:</a:t>
-            </a:r>
-            <a:br>
-              <a:rPr lang="en-GB" dirty="0"/>
-            </a:br>
-            <a:br>
-              <a:rPr lang="en-GB" dirty="0"/>
-            </a:br>
-            <a:r>
-              <a:rPr lang="en-GB" dirty="0"/>
-              <a:t>After fetching the data, you can access it in your JavaScript code.</a:t>
-            </a:r>
-          </a:p>
-          <a:p>
-            <a:pPr>
-              <a:buFont typeface="Arial" panose="020B0604020202020204" pitchFamily="34" charset="0"/>
-              <a:buChar char="•"/>
-            </a:pPr>
-            <a:r>
-              <a:rPr lang="en-GB" dirty="0"/>
-              <a:t>Example of accessing fields in JSON</a:t>
-            </a:r>
-          </a:p>
-        </p:txBody>
-      </p:sp>
-      <p:pic>
-        <p:nvPicPr>
-          <p:cNvPr id="5" name="Picture 4" descr="A black background with white text&#10;&#10;Description automatically generated">
-            <a:extLst>
-              <a:ext uri="{FF2B5EF4-FFF2-40B4-BE49-F238E27FC236}">
-                <a16:creationId xmlns:a16="http://schemas.microsoft.com/office/drawing/2014/main" id="{8B856F2D-38CB-BE08-E4E4-D10FCB5091F3}"/>
-              </a:ext>
-            </a:extLst>
-          </p:cNvPr>
-          <p:cNvPicPr>
-            <a:picLocks noChangeAspect="1"/>
-          </p:cNvPicPr>
-          <p:nvPr/>
-        </p:nvPicPr>
-        <p:blipFill>
-          <a:blip r:embed="rId2"/>
-          <a:stretch>
-            <a:fillRect/>
-          </a:stretch>
-        </p:blipFill>
-        <p:spPr>
-          <a:xfrm>
-            <a:off x="6096000" y="3841454"/>
-            <a:ext cx="4800600" cy="876300"/>
-          </a:xfrm>
-          <a:prstGeom prst="rect">
-            <a:avLst/>
-          </a:prstGeom>
-        </p:spPr>
-      </p:pic>
-    </p:spTree>
-    <p:extLst>
-      <p:ext uri="{BB962C8B-B14F-4D97-AF65-F5344CB8AC3E}">
-        <p14:creationId xmlns:p14="http://schemas.microsoft.com/office/powerpoint/2010/main" val="2961728623"/>
-      </p:ext>
-    </p:extLst>
-  </p:cSld>
-  <p:clrMapOvr>
-    <a:masterClrMapping/>
-  </p:clrMapOvr>
-</p:sld>
-</file>
-
-<file path=ppt/slides/slide11.xml><?xml version="1.0" encoding="utf-8"?>
-<p:sld xmlns:a="http://schemas.openxmlformats.org/drawingml/2006/main" xmlns:r="http://schemas.openxmlformats.org/officeDocument/2006/relationships" xmlns:p="http://schemas.openxmlformats.org/presentationml/2006/main">
-  <p:cSld>
-    <p:spTree>
-      <p:nvGrpSpPr>
-        <p:cNvPr id="1" name="">
-          <a:extLst>
-            <a:ext uri="{FF2B5EF4-FFF2-40B4-BE49-F238E27FC236}">
-              <a16:creationId xmlns:a16="http://schemas.microsoft.com/office/drawing/2014/main" id="{F862AD62-4549-3411-613C-C87866C4C489}"/>
-            </a:ext>
-          </a:extLst>
-        </p:cNvPr>
-        <p:cNvGrpSpPr/>
-        <p:nvPr/>
-      </p:nvGrpSpPr>
-      <p:grpSpPr>
-        <a:xfrm>
-          <a:off x="0" y="0"/>
-          <a:ext cx="0" cy="0"/>
-          <a:chOff x="0" y="0"/>
-          <a:chExt cx="0" cy="0"/>
-        </a:xfrm>
-      </p:grpSpPr>
-      <p:sp>
-        <p:nvSpPr>
-          <p:cNvPr id="2" name="Title 1">
-            <a:extLst>
-              <a:ext uri="{FF2B5EF4-FFF2-40B4-BE49-F238E27FC236}">
-                <a16:creationId xmlns:a16="http://schemas.microsoft.com/office/drawing/2014/main" id="{10DFF660-424B-1644-52D3-123663384D33}"/>
-              </a:ext>
-            </a:extLst>
-          </p:cNvPr>
-          <p:cNvSpPr>
-            <a:spLocks noGrp="1"/>
-          </p:cNvSpPr>
-          <p:nvPr>
-            <p:ph type="title"/>
-          </p:nvPr>
-        </p:nvSpPr>
-        <p:spPr>
-          <a:xfrm>
-            <a:off x="581193" y="729658"/>
-            <a:ext cx="11029616" cy="988332"/>
-          </a:xfrm>
-        </p:spPr>
-        <p:txBody>
-          <a:bodyPr anchor="b">
-            <a:normAutofit/>
-          </a:bodyPr>
-          <a:lstStyle/>
-          <a:p>
-            <a:r>
-              <a:rPr lang="en-GB" dirty="0"/>
-              <a:t>Updating DOM Elements with JSON Data</a:t>
-            </a:r>
-          </a:p>
-        </p:txBody>
-      </p:sp>
-      <p:sp>
-        <p:nvSpPr>
-          <p:cNvPr id="3" name="Content Placeholder 2">
-            <a:extLst>
-              <a:ext uri="{FF2B5EF4-FFF2-40B4-BE49-F238E27FC236}">
-                <a16:creationId xmlns:a16="http://schemas.microsoft.com/office/drawing/2014/main" id="{2DB3D8CF-732E-3BB4-5E5A-951912E82DAE}"/>
-              </a:ext>
-            </a:extLst>
-          </p:cNvPr>
-          <p:cNvSpPr>
-            <a:spLocks noGrp="1"/>
-          </p:cNvSpPr>
-          <p:nvPr>
-            <p:ph sz="half" idx="1"/>
-          </p:nvPr>
-        </p:nvSpPr>
-        <p:spPr>
-          <a:xfrm>
-            <a:off x="581193" y="2228003"/>
-            <a:ext cx="5422390" cy="3633047"/>
-          </a:xfrm>
-        </p:spPr>
-        <p:txBody>
-          <a:bodyPr anchor="ctr">
-            <a:normAutofit/>
-          </a:bodyPr>
-          <a:lstStyle/>
-          <a:p>
-            <a:pPr>
-              <a:buFont typeface="Arial" panose="020B0604020202020204" pitchFamily="34" charset="0"/>
-              <a:buChar char="•"/>
-            </a:pPr>
-            <a:r>
-              <a:rPr lang="en-GB" b="1" dirty="0"/>
-              <a:t>DOM Manipulation</a:t>
-            </a:r>
-            <a:r>
-              <a:rPr lang="en-GB" dirty="0"/>
-              <a:t>:</a:t>
-            </a:r>
-            <a:br>
-              <a:rPr lang="en-GB" dirty="0"/>
-            </a:br>
-            <a:br>
-              <a:rPr lang="en-GB" dirty="0"/>
-            </a:br>
-            <a:r>
-              <a:rPr lang="en-GB" dirty="0"/>
-              <a:t>Use JSON data to update elements on the web page dynamically.</a:t>
-            </a:r>
-            <a:br>
-              <a:rPr lang="en-GB" dirty="0"/>
-            </a:br>
-            <a:br>
-              <a:rPr lang="en-GB" dirty="0"/>
-            </a:br>
-            <a:r>
-              <a:rPr lang="en-GB" b="1" dirty="0"/>
-              <a:t>Practical Example</a:t>
-            </a:r>
-            <a:r>
-              <a:rPr lang="en-GB" dirty="0"/>
-              <a:t>:</a:t>
-            </a:r>
-          </a:p>
-          <a:p>
-            <a:pPr marL="742950" lvl="1" indent="-285750">
-              <a:buFont typeface="Arial" panose="020B0604020202020204" pitchFamily="34" charset="0"/>
-              <a:buChar char="•"/>
-            </a:pPr>
-            <a:r>
-              <a:rPr lang="en-GB" dirty="0"/>
-              <a:t>Fetch weather data and update a weather dashboard.</a:t>
-            </a:r>
-          </a:p>
-          <a:p>
-            <a:pPr>
-              <a:buFont typeface="Arial" panose="020B0604020202020204" pitchFamily="34" charset="0"/>
-              <a:buChar char="•"/>
-            </a:pPr>
-            <a:endParaRPr lang="en-GB" dirty="0"/>
-          </a:p>
-        </p:txBody>
-      </p:sp>
-      <p:pic>
-        <p:nvPicPr>
-          <p:cNvPr id="5" name="Picture 4">
-            <a:extLst>
-              <a:ext uri="{FF2B5EF4-FFF2-40B4-BE49-F238E27FC236}">
-                <a16:creationId xmlns:a16="http://schemas.microsoft.com/office/drawing/2014/main" id="{8C93400A-D04C-2DC3-6D6A-AA7D8B3D403F}"/>
-              </a:ext>
-            </a:extLst>
-          </p:cNvPr>
-          <p:cNvPicPr>
-            <a:picLocks noChangeAspect="1"/>
-          </p:cNvPicPr>
-          <p:nvPr/>
-        </p:nvPicPr>
-        <p:blipFill>
-          <a:blip r:embed="rId2"/>
-          <a:stretch>
-            <a:fillRect/>
-          </a:stretch>
-        </p:blipFill>
-        <p:spPr>
-          <a:xfrm>
-            <a:off x="763799" y="5302250"/>
-            <a:ext cx="6375400" cy="558800"/>
-          </a:xfrm>
-          <a:prstGeom prst="rect">
-            <a:avLst/>
-          </a:prstGeom>
-        </p:spPr>
-      </p:pic>
-    </p:spTree>
-    <p:extLst>
-      <p:ext uri="{BB962C8B-B14F-4D97-AF65-F5344CB8AC3E}">
-        <p14:creationId xmlns:p14="http://schemas.microsoft.com/office/powerpoint/2010/main" val="3696916899"/>
-      </p:ext>
-    </p:extLst>
-  </p:cSld>
-  <p:clrMapOvr>
-    <a:masterClrMapping/>
-  </p:clrMapOvr>
-</p:sld>
-</file>
-
-<file path=ppt/slides/slide12.xml><?xml version="1.0" encoding="utf-8"?>
 <p:sld xmlns:a="http://schemas.openxmlformats.org/drawingml/2006/main" xmlns:r="http://schemas.openxmlformats.org/officeDocument/2006/relationships" xmlns:p="http://schemas.openxmlformats.org/presentationml/2006/main">
   <p:cSld>
     <p:spTree>
@@ -5883,26 +5854,88 @@
           <a:lstStyle/>
           <a:p>
             <a:r>
-              <a:rPr lang="en-GB" dirty="0"/>
-              <a:t>HTTP is essential for web communication.</a:t>
-            </a:r>
-          </a:p>
-          <a:p>
-            <a:r>
-              <a:rPr lang="en-GB" dirty="0"/>
-              <a:t>You can make HTTP requests using Postman or JavaScript (Fetch).</a:t>
-            </a:r>
-          </a:p>
-          <a:p>
-            <a:r>
-              <a:rPr lang="en-GB" dirty="0"/>
-              <a:t>JSON is the common data format for APIs.</a:t>
-            </a:r>
-          </a:p>
-          <a:p>
-            <a:r>
-              <a:rPr lang="en-GB" dirty="0"/>
-              <a:t>Learn how to update your web page dynamically using data from APIs.</a:t>
+              <a:rPr lang="en-GB" b="1" dirty="0"/>
+              <a:t>Styling Options</a:t>
+            </a:r>
+            <a:r>
+              <a:rPr lang="en-GB" dirty="0"/>
+              <a:t>:</a:t>
+            </a:r>
+          </a:p>
+          <a:p>
+            <a:pPr marL="742950" lvl="1" indent="-285750">
+              <a:buFont typeface="Arial" panose="020B0604020202020204" pitchFamily="34" charset="0"/>
+              <a:buChar char="•"/>
+            </a:pPr>
+            <a:r>
+              <a:rPr lang="en-GB" dirty="0"/>
+              <a:t>Inline, CSS Stylesheets, CSS Modules, Styled Components.</a:t>
+            </a:r>
+          </a:p>
+          <a:p>
+            <a:r>
+              <a:rPr lang="en-GB" b="1" dirty="0"/>
+              <a:t>Assets</a:t>
+            </a:r>
+            <a:r>
+              <a:rPr lang="en-GB" dirty="0"/>
+              <a:t>:</a:t>
+            </a:r>
+          </a:p>
+          <a:p>
+            <a:pPr marL="742950" lvl="1" indent="-285750">
+              <a:buFont typeface="Arial" panose="020B0604020202020204" pitchFamily="34" charset="0"/>
+              <a:buChar char="•"/>
+            </a:pPr>
+            <a:r>
+              <a:rPr lang="en-GB" dirty="0"/>
+              <a:t>How to import images and assets, and when to use </a:t>
+            </a:r>
+            <a:r>
+              <a:rPr lang="en-GB" dirty="0" err="1"/>
+              <a:t>src</a:t>
+            </a:r>
+            <a:r>
+              <a:rPr lang="en-GB" dirty="0"/>
+              <a:t> vs. public folder.</a:t>
+            </a:r>
+          </a:p>
+          <a:p>
+            <a:r>
+              <a:rPr lang="en-GB" b="1" dirty="0"/>
+              <a:t>State and Side Effects</a:t>
+            </a:r>
+            <a:r>
+              <a:rPr lang="en-GB" dirty="0"/>
+              <a:t>:</a:t>
+            </a:r>
+          </a:p>
+          <a:p>
+            <a:pPr marL="742950" lvl="1" indent="-285750">
+              <a:buFont typeface="Arial" panose="020B0604020202020204" pitchFamily="34" charset="0"/>
+              <a:buChar char="•"/>
+            </a:pPr>
+            <a:r>
+              <a:rPr lang="en-GB" dirty="0" err="1"/>
+              <a:t>useState</a:t>
+            </a:r>
+            <a:r>
+              <a:rPr lang="en-GB" dirty="0"/>
+              <a:t> for managing component state.</a:t>
+            </a:r>
+          </a:p>
+          <a:p>
+            <a:pPr marL="742950" lvl="1" indent="-285750">
+              <a:buFont typeface="Arial" panose="020B0604020202020204" pitchFamily="34" charset="0"/>
+              <a:buChar char="•"/>
+            </a:pPr>
+            <a:r>
+              <a:rPr lang="en-GB" dirty="0" err="1"/>
+              <a:t>useEffect</a:t>
+            </a:r>
+            <a:r>
+              <a:rPr lang="en-GB" dirty="0"/>
+              <a:t> for side effects and data fetching.</a:t>
             </a:r>
           </a:p>
         </p:txBody>
@@ -5920,7 +5953,7 @@
 </p:sld>
 </file>
 
-<file path=ppt/slides/slide13.xml><?xml version="1.0" encoding="utf-8"?>
+<file path=ppt/slides/slide11.xml><?xml version="1.0" encoding="utf-8"?>
 <p:sld xmlns:a="http://schemas.openxmlformats.org/drawingml/2006/main" xmlns:r="http://schemas.openxmlformats.org/officeDocument/2006/relationships" xmlns:p="http://schemas.openxmlformats.org/presentationml/2006/main">
   <p:cSld>
     <p:spTree>
@@ -6037,7 +6070,7 @@
           <a:p>
             <a:r>
               <a:rPr lang="en-GB" dirty="0"/>
-              <a:t>HTTP and 3rd Party APIs</a:t>
+              <a:t>Understanding Styling, Assets, and State in React</a:t>
             </a:r>
           </a:p>
         </p:txBody>
@@ -6092,7 +6125,7 @@
             </a:pPr>
             <a:r>
               <a:rPr lang="en-GB" dirty="0"/>
-              <a:t>The basics of HTTP</a:t>
+              <a:t>Methods of applying style in React</a:t>
             </a:r>
           </a:p>
           <a:p>
@@ -6102,7 +6135,7 @@
             </a:pPr>
             <a:r>
               <a:rPr lang="en-GB" dirty="0"/>
-              <a:t>How to make HTTP requests</a:t>
+              <a:t>Using images and other assets</a:t>
             </a:r>
           </a:p>
           <a:p>
@@ -6112,18 +6145,21 @@
             </a:pPr>
             <a:r>
               <a:rPr lang="en-GB" dirty="0"/>
-              <a:t>Using APIs with tools like Postman</a:t>
-            </a:r>
-          </a:p>
-          <a:p>
-            <a:pPr>
-              <a:buFont typeface="+mj-lt"/>
-              <a:buAutoNum type="arabicPeriod"/>
-            </a:pPr>
-            <a:r>
-              <a:rPr lang="en-GB" dirty="0"/>
-              <a:t>Fetching and using JSON data in JavaScript</a:t>
-            </a:r>
+              <a:t>React Hooks, </a:t>
+            </a:r>
+            <a:r>
+              <a:rPr lang="en-GB" dirty="0" err="1"/>
+              <a:t>useEffect</a:t>
+            </a:r>
+            <a:r>
+              <a:rPr lang="en-GB" dirty="0"/>
+              <a:t> and </a:t>
+            </a:r>
+            <a:r>
+              <a:rPr lang="en-GB" dirty="0" err="1"/>
+              <a:t>useState</a:t>
+            </a:r>
+            <a:endParaRPr lang="en-GB" dirty="0"/>
           </a:p>
         </p:txBody>
       </p:sp>
@@ -6187,7 +6223,7 @@
           <a:p>
             <a:r>
               <a:rPr lang="en-GB" dirty="0"/>
-              <a:t>The Fundamentals of HTTP</a:t>
+              <a:t>Different Ways of Applying Style in React</a:t>
             </a:r>
           </a:p>
         </p:txBody>
@@ -6220,79 +6256,88 @@
           </a:bodyPr>
           <a:lstStyle/>
           <a:p>
-            <a:pPr>
-              <a:buFont typeface="Arial" panose="020B0604020202020204" pitchFamily="34" charset="0"/>
-              <a:buChar char="•"/>
-            </a:pPr>
             <a:r>
               <a:rPr lang="en-GB" b="1" dirty="0"/>
-              <a:t>What is HTTP</a:t>
+              <a:t>Inline Styles</a:t>
             </a:r>
             <a:r>
               <a:rPr lang="en-GB" dirty="0"/>
               <a:t>:</a:t>
             </a:r>
-          </a:p>
-          <a:p>
-            <a:pPr marL="742950" lvl="1" indent="-285750">
-              <a:buFont typeface="Arial" panose="020B0604020202020204" pitchFamily="34" charset="0"/>
-              <a:buChar char="•"/>
-            </a:pPr>
-            <a:r>
-              <a:rPr lang="en-GB" dirty="0" err="1"/>
-              <a:t>HyperText</a:t>
-            </a:r>
-            <a:r>
-              <a:rPr lang="en-GB" dirty="0"/>
-              <a:t> Transfer Protocol (HTTP) is the foundation of communication on the web.</a:t>
-            </a:r>
-          </a:p>
-          <a:p>
-            <a:pPr marL="742950" lvl="1" indent="-285750">
-              <a:buFont typeface="Arial" panose="020B0604020202020204" pitchFamily="34" charset="0"/>
-              <a:buChar char="•"/>
-            </a:pPr>
-            <a:r>
-              <a:rPr lang="en-GB" dirty="0"/>
-              <a:t>It enables browsers and servers to exchange data.</a:t>
-            </a:r>
-          </a:p>
-          <a:p>
-            <a:pPr>
-              <a:buFont typeface="Arial" panose="020B0604020202020204" pitchFamily="34" charset="0"/>
-              <a:buChar char="•"/>
-            </a:pPr>
+            <a:br>
+              <a:rPr lang="en-GB" dirty="0"/>
+            </a:br>
+            <a:r>
+              <a:rPr lang="en-GB" dirty="0"/>
+              <a:t>Defined directly in JSX elements as an object.</a:t>
+            </a:r>
+          </a:p>
+          <a:p>
             <a:r>
               <a:rPr lang="en-GB" b="1" dirty="0"/>
-              <a:t>Key Concepts</a:t>
-            </a:r>
-            <a:r>
-              <a:rPr lang="en-GB" dirty="0"/>
-              <a:t>:</a:t>
-            </a:r>
-          </a:p>
-          <a:p>
-            <a:pPr marL="742950" lvl="1" indent="-285750">
-              <a:buFont typeface="Arial" panose="020B0604020202020204" pitchFamily="34" charset="0"/>
-              <a:buChar char="•"/>
-            </a:pPr>
-            <a:r>
-              <a:rPr lang="en-GB" dirty="0"/>
-              <a:t>Clients (your browser, Postman) request resources.</a:t>
-            </a:r>
-          </a:p>
-          <a:p>
-            <a:pPr marL="742950" lvl="1" indent="-285750">
-              <a:buFont typeface="Arial" panose="020B0604020202020204" pitchFamily="34" charset="0"/>
-              <a:buChar char="•"/>
-            </a:pPr>
-            <a:r>
-              <a:rPr lang="en-GB" dirty="0"/>
-              <a:t>Servers respond to those requests.</a:t>
-            </a:r>
-          </a:p>
-        </p:txBody>
-      </p:sp>
+              <a:t>Pros</a:t>
+            </a:r>
+            <a:r>
+              <a:rPr lang="en-GB" dirty="0"/>
+              <a:t>: </a:t>
+            </a:r>
+            <a:br>
+              <a:rPr lang="en-GB" dirty="0"/>
+            </a:br>
+            <a:r>
+              <a:rPr lang="en-GB" dirty="0"/>
+              <a:t>Quick for small, dynamic styles.</a:t>
+            </a:r>
+          </a:p>
+          <a:p>
+            <a:r>
+              <a:rPr lang="en-GB" b="1" dirty="0"/>
+              <a:t>Cons</a:t>
+            </a:r>
+            <a:r>
+              <a:rPr lang="en-GB" dirty="0"/>
+              <a:t>: </a:t>
+            </a:r>
+            <a:br>
+              <a:rPr lang="en-GB" dirty="0"/>
+            </a:br>
+            <a:r>
+              <a:rPr lang="en-GB" dirty="0"/>
+              <a:t>Difficult to manage for larger, complex styles.</a:t>
+            </a:r>
+          </a:p>
+        </p:txBody>
+      </p:sp>
+      <p:pic>
+        <p:nvPicPr>
+          <p:cNvPr id="5" name="Picture 4">
+            <a:extLst>
+              <a:ext uri="{FF2B5EF4-FFF2-40B4-BE49-F238E27FC236}">
+                <a16:creationId xmlns:a16="http://schemas.microsoft.com/office/drawing/2014/main" id="{4ECCDBD1-CC0F-08DD-4353-18EEABC57481}"/>
+              </a:ext>
+            </a:extLst>
+          </p:cNvPr>
+          <p:cNvPicPr>
+            <a:picLocks noChangeAspect="1"/>
+          </p:cNvPicPr>
+          <p:nvPr/>
+        </p:nvPicPr>
+        <p:blipFill>
+          <a:blip r:embed="rId3"/>
+          <a:stretch>
+            <a:fillRect/>
+          </a:stretch>
+        </p:blipFill>
+        <p:spPr>
+          <a:xfrm>
+            <a:off x="2805723" y="5378450"/>
+            <a:ext cx="7518400" cy="482600"/>
+          </a:xfrm>
+          <a:prstGeom prst="rect">
+            <a:avLst/>
+          </a:prstGeom>
+        </p:spPr>
+      </p:pic>
     </p:spTree>
     <p:extLst>
       <p:ext uri="{BB962C8B-B14F-4D97-AF65-F5344CB8AC3E}">
@@ -6307,6 +6352,566 @@
 </file>
 
 <file path=ppt/slides/slide4.xml><?xml version="1.0" encoding="utf-8"?>
+<p:sld xmlns:a="http://schemas.openxmlformats.org/drawingml/2006/main" xmlns:r="http://schemas.openxmlformats.org/officeDocument/2006/relationships" xmlns:p="http://schemas.openxmlformats.org/presentationml/2006/main">
+  <p:cSld>
+    <p:spTree>
+      <p:nvGrpSpPr>
+        <p:cNvPr id="1" name="">
+          <a:extLst>
+            <a:ext uri="{FF2B5EF4-FFF2-40B4-BE49-F238E27FC236}">
+              <a16:creationId xmlns:a16="http://schemas.microsoft.com/office/drawing/2014/main" id="{09107874-8FDB-FEBE-0249-E4775B60520C}"/>
+            </a:ext>
+          </a:extLst>
+        </p:cNvPr>
+        <p:cNvGrpSpPr/>
+        <p:nvPr/>
+      </p:nvGrpSpPr>
+      <p:grpSpPr>
+        <a:xfrm>
+          <a:off x="0" y="0"/>
+          <a:ext cx="0" cy="0"/>
+          <a:chOff x="0" y="0"/>
+          <a:chExt cx="0" cy="0"/>
+        </a:xfrm>
+      </p:grpSpPr>
+      <p:sp>
+        <p:nvSpPr>
+          <p:cNvPr id="2" name="Title 1">
+            <a:extLst>
+              <a:ext uri="{FF2B5EF4-FFF2-40B4-BE49-F238E27FC236}">
+                <a16:creationId xmlns:a16="http://schemas.microsoft.com/office/drawing/2014/main" id="{CFC74CA9-6D51-37DA-1A36-4CE65801E1B5}"/>
+              </a:ext>
+            </a:extLst>
+          </p:cNvPr>
+          <p:cNvSpPr>
+            <a:spLocks noGrp="1"/>
+          </p:cNvSpPr>
+          <p:nvPr>
+            <p:ph type="title"/>
+          </p:nvPr>
+        </p:nvSpPr>
+        <p:spPr>
+          <a:xfrm>
+            <a:off x="581193" y="729658"/>
+            <a:ext cx="11029616" cy="988332"/>
+          </a:xfrm>
+        </p:spPr>
+        <p:txBody>
+          <a:bodyPr anchor="b">
+            <a:normAutofit/>
+          </a:bodyPr>
+          <a:lstStyle/>
+          <a:p>
+            <a:r>
+              <a:rPr lang="en-GB" dirty="0"/>
+              <a:t>Different Ways of Applying Style in React</a:t>
+            </a:r>
+          </a:p>
+        </p:txBody>
+      </p:sp>
+      <p:sp>
+        <p:nvSpPr>
+          <p:cNvPr id="3" name="Content Placeholder 2">
+            <a:extLst>
+              <a:ext uri="{FF2B5EF4-FFF2-40B4-BE49-F238E27FC236}">
+                <a16:creationId xmlns:a16="http://schemas.microsoft.com/office/drawing/2014/main" id="{2EF00CCF-6701-CBA8-F186-884F4D48702F}"/>
+              </a:ext>
+            </a:extLst>
+          </p:cNvPr>
+          <p:cNvSpPr>
+            <a:spLocks noGrp="1"/>
+          </p:cNvSpPr>
+          <p:nvPr>
+            <p:ph sz="half" idx="1"/>
+          </p:nvPr>
+        </p:nvSpPr>
+        <p:spPr>
+          <a:xfrm>
+            <a:off x="581193" y="2228003"/>
+            <a:ext cx="5422390" cy="3633047"/>
+          </a:xfrm>
+        </p:spPr>
+        <p:txBody>
+          <a:bodyPr anchor="ctr">
+            <a:normAutofit/>
+          </a:bodyPr>
+          <a:lstStyle/>
+          <a:p>
+            <a:r>
+              <a:rPr lang="en-GB" b="1" dirty="0"/>
+              <a:t>CSS Stylesheets</a:t>
+            </a:r>
+            <a:r>
+              <a:rPr lang="en-GB" dirty="0"/>
+              <a:t>:</a:t>
+            </a:r>
+            <a:br>
+              <a:rPr lang="en-GB" dirty="0"/>
+            </a:br>
+            <a:r>
+              <a:rPr lang="en-GB" dirty="0"/>
+              <a:t>Traditional CSS files imported into the component.</a:t>
+            </a:r>
+          </a:p>
+          <a:p>
+            <a:r>
+              <a:rPr lang="en-GB" b="1" dirty="0"/>
+              <a:t>Pros</a:t>
+            </a:r>
+            <a:r>
+              <a:rPr lang="en-GB" dirty="0"/>
+              <a:t>: </a:t>
+            </a:r>
+            <a:br>
+              <a:rPr lang="en-GB" dirty="0"/>
+            </a:br>
+            <a:r>
+              <a:rPr lang="en-GB" dirty="0"/>
+              <a:t>Familiar and simple to maintain.</a:t>
+            </a:r>
+          </a:p>
+          <a:p>
+            <a:r>
+              <a:rPr lang="en-GB" b="1" dirty="0"/>
+              <a:t>Cons</a:t>
+            </a:r>
+            <a:r>
+              <a:rPr lang="en-GB" dirty="0"/>
+              <a:t>: </a:t>
+            </a:r>
+            <a:br>
+              <a:rPr lang="en-GB" dirty="0"/>
+            </a:br>
+            <a:r>
+              <a:rPr lang="en-GB" dirty="0"/>
+              <a:t>Styles are globally scoped by default.</a:t>
+            </a:r>
+          </a:p>
+        </p:txBody>
+      </p:sp>
+      <p:pic>
+        <p:nvPicPr>
+          <p:cNvPr id="6" name="Picture 5" descr="A black background with green letters&#10;&#10;Description automatically generated">
+            <a:extLst>
+              <a:ext uri="{FF2B5EF4-FFF2-40B4-BE49-F238E27FC236}">
+                <a16:creationId xmlns:a16="http://schemas.microsoft.com/office/drawing/2014/main" id="{BF1D2C0B-83DA-501B-B9DE-18ACE5D7DC7E}"/>
+              </a:ext>
+            </a:extLst>
+          </p:cNvPr>
+          <p:cNvPicPr>
+            <a:picLocks noChangeAspect="1"/>
+          </p:cNvPicPr>
+          <p:nvPr/>
+        </p:nvPicPr>
+        <p:blipFill>
+          <a:blip r:embed="rId3"/>
+          <a:stretch>
+            <a:fillRect/>
+          </a:stretch>
+        </p:blipFill>
+        <p:spPr>
+          <a:xfrm>
+            <a:off x="6602534" y="3720676"/>
+            <a:ext cx="3441700" cy="647700"/>
+          </a:xfrm>
+          <a:prstGeom prst="rect">
+            <a:avLst/>
+          </a:prstGeom>
+        </p:spPr>
+      </p:pic>
+    </p:spTree>
+    <p:extLst>
+      <p:ext uri="{BB962C8B-B14F-4D97-AF65-F5344CB8AC3E}">
+        <p14:creationId xmlns:p14="http://schemas.microsoft.com/office/powerpoint/2010/main" val="2209405033"/>
+      </p:ext>
+    </p:extLst>
+  </p:cSld>
+  <p:clrMapOvr>
+    <a:masterClrMapping/>
+  </p:clrMapOvr>
+</p:sld>
+</file>
+
+<file path=ppt/slides/slide5.xml><?xml version="1.0" encoding="utf-8"?>
+<p:sld xmlns:a="http://schemas.openxmlformats.org/drawingml/2006/main" xmlns:r="http://schemas.openxmlformats.org/officeDocument/2006/relationships" xmlns:p="http://schemas.openxmlformats.org/presentationml/2006/main">
+  <p:cSld>
+    <p:spTree>
+      <p:nvGrpSpPr>
+        <p:cNvPr id="1" name="">
+          <a:extLst>
+            <a:ext uri="{FF2B5EF4-FFF2-40B4-BE49-F238E27FC236}">
+              <a16:creationId xmlns:a16="http://schemas.microsoft.com/office/drawing/2014/main" id="{1BA340A8-6C9E-FE82-B955-819DCA87377B}"/>
+            </a:ext>
+          </a:extLst>
+        </p:cNvPr>
+        <p:cNvGrpSpPr/>
+        <p:nvPr/>
+      </p:nvGrpSpPr>
+      <p:grpSpPr>
+        <a:xfrm>
+          <a:off x="0" y="0"/>
+          <a:ext cx="0" cy="0"/>
+          <a:chOff x="0" y="0"/>
+          <a:chExt cx="0" cy="0"/>
+        </a:xfrm>
+      </p:grpSpPr>
+      <p:sp>
+        <p:nvSpPr>
+          <p:cNvPr id="2" name="Title 1">
+            <a:extLst>
+              <a:ext uri="{FF2B5EF4-FFF2-40B4-BE49-F238E27FC236}">
+                <a16:creationId xmlns:a16="http://schemas.microsoft.com/office/drawing/2014/main" id="{E4AD22AA-94FA-8EAE-5602-F449BE70C545}"/>
+              </a:ext>
+            </a:extLst>
+          </p:cNvPr>
+          <p:cNvSpPr>
+            <a:spLocks noGrp="1"/>
+          </p:cNvSpPr>
+          <p:nvPr>
+            <p:ph type="title"/>
+          </p:nvPr>
+        </p:nvSpPr>
+        <p:spPr>
+          <a:xfrm>
+            <a:off x="581193" y="729658"/>
+            <a:ext cx="11029616" cy="988332"/>
+          </a:xfrm>
+        </p:spPr>
+        <p:txBody>
+          <a:bodyPr anchor="b">
+            <a:normAutofit/>
+          </a:bodyPr>
+          <a:lstStyle/>
+          <a:p>
+            <a:r>
+              <a:rPr lang="en-GB" dirty="0"/>
+              <a:t>Different Ways of Applying Style in React</a:t>
+            </a:r>
+          </a:p>
+        </p:txBody>
+      </p:sp>
+      <p:sp>
+        <p:nvSpPr>
+          <p:cNvPr id="3" name="Content Placeholder 2">
+            <a:extLst>
+              <a:ext uri="{FF2B5EF4-FFF2-40B4-BE49-F238E27FC236}">
+                <a16:creationId xmlns:a16="http://schemas.microsoft.com/office/drawing/2014/main" id="{1D131F9C-AA59-A1CE-F56A-0EE0963991A1}"/>
+              </a:ext>
+            </a:extLst>
+          </p:cNvPr>
+          <p:cNvSpPr>
+            <a:spLocks noGrp="1"/>
+          </p:cNvSpPr>
+          <p:nvPr>
+            <p:ph sz="half" idx="1"/>
+          </p:nvPr>
+        </p:nvSpPr>
+        <p:spPr>
+          <a:xfrm>
+            <a:off x="581193" y="2228003"/>
+            <a:ext cx="5422390" cy="3633047"/>
+          </a:xfrm>
+        </p:spPr>
+        <p:txBody>
+          <a:bodyPr anchor="ctr">
+            <a:normAutofit/>
+          </a:bodyPr>
+          <a:lstStyle/>
+          <a:p>
+            <a:r>
+              <a:rPr lang="en-GB" b="1" dirty="0"/>
+              <a:t>CSS Modules</a:t>
+            </a:r>
+            <a:r>
+              <a:rPr lang="en-GB" dirty="0"/>
+              <a:t>:</a:t>
+            </a:r>
+            <a:br>
+              <a:rPr lang="en-GB" dirty="0"/>
+            </a:br>
+            <a:r>
+              <a:rPr lang="en-GB" dirty="0"/>
+              <a:t>CSS files that are locally scoped to components (e.g., </a:t>
+            </a:r>
+            <a:r>
+              <a:rPr lang="en-GB" dirty="0" err="1"/>
+              <a:t>App.module.css</a:t>
+            </a:r>
+            <a:r>
+              <a:rPr lang="en-GB" dirty="0"/>
+              <a:t>).</a:t>
+            </a:r>
+          </a:p>
+          <a:p>
+            <a:r>
+              <a:rPr lang="en-GB" b="1" dirty="0"/>
+              <a:t>Pros</a:t>
+            </a:r>
+            <a:r>
+              <a:rPr lang="en-GB" dirty="0"/>
+              <a:t>: </a:t>
+            </a:r>
+            <a:br>
+              <a:rPr lang="en-GB" dirty="0"/>
+            </a:br>
+            <a:r>
+              <a:rPr lang="en-GB" dirty="0"/>
+              <a:t>Avoids global scope conflicts.</a:t>
+            </a:r>
+          </a:p>
+          <a:p>
+            <a:r>
+              <a:rPr lang="en-GB" b="1" dirty="0"/>
+              <a:t>Cons</a:t>
+            </a:r>
+            <a:r>
+              <a:rPr lang="en-GB" dirty="0"/>
+              <a:t>: </a:t>
+            </a:r>
+            <a:br>
+              <a:rPr lang="en-GB" dirty="0"/>
+            </a:br>
+            <a:r>
+              <a:rPr lang="en-GB" dirty="0"/>
+              <a:t>Requires additional setup and syntax.</a:t>
+            </a:r>
+          </a:p>
+        </p:txBody>
+      </p:sp>
+      <p:pic>
+        <p:nvPicPr>
+          <p:cNvPr id="7" name="Picture 6" descr="A black background with green text&#10;&#10;Description automatically generated">
+            <a:extLst>
+              <a:ext uri="{FF2B5EF4-FFF2-40B4-BE49-F238E27FC236}">
+                <a16:creationId xmlns:a16="http://schemas.microsoft.com/office/drawing/2014/main" id="{5AC21342-86D5-A6FE-C208-37C7267EE3CC}"/>
+              </a:ext>
+            </a:extLst>
+          </p:cNvPr>
+          <p:cNvPicPr>
+            <a:picLocks noChangeAspect="1"/>
+          </p:cNvPicPr>
+          <p:nvPr/>
+        </p:nvPicPr>
+        <p:blipFill>
+          <a:blip r:embed="rId3"/>
+          <a:stretch>
+            <a:fillRect/>
+          </a:stretch>
+        </p:blipFill>
+        <p:spPr>
+          <a:xfrm>
+            <a:off x="5591007" y="3644476"/>
+            <a:ext cx="6019800" cy="800100"/>
+          </a:xfrm>
+          <a:prstGeom prst="rect">
+            <a:avLst/>
+          </a:prstGeom>
+        </p:spPr>
+      </p:pic>
+    </p:spTree>
+    <p:extLst>
+      <p:ext uri="{BB962C8B-B14F-4D97-AF65-F5344CB8AC3E}">
+        <p14:creationId xmlns:p14="http://schemas.microsoft.com/office/powerpoint/2010/main" val="3050123564"/>
+      </p:ext>
+    </p:extLst>
+  </p:cSld>
+  <p:clrMapOvr>
+    <a:masterClrMapping/>
+  </p:clrMapOvr>
+</p:sld>
+</file>
+
+<file path=ppt/slides/slide6.xml><?xml version="1.0" encoding="utf-8"?>
+<p:sld xmlns:a="http://schemas.openxmlformats.org/drawingml/2006/main" xmlns:r="http://schemas.openxmlformats.org/officeDocument/2006/relationships" xmlns:p="http://schemas.openxmlformats.org/presentationml/2006/main">
+  <p:cSld>
+    <p:spTree>
+      <p:nvGrpSpPr>
+        <p:cNvPr id="1" name="">
+          <a:extLst>
+            <a:ext uri="{FF2B5EF4-FFF2-40B4-BE49-F238E27FC236}">
+              <a16:creationId xmlns:a16="http://schemas.microsoft.com/office/drawing/2014/main" id="{0D89C6A7-FE17-7290-FB3D-4E254D0C3CBD}"/>
+            </a:ext>
+          </a:extLst>
+        </p:cNvPr>
+        <p:cNvGrpSpPr/>
+        <p:nvPr/>
+      </p:nvGrpSpPr>
+      <p:grpSpPr>
+        <a:xfrm>
+          <a:off x="0" y="0"/>
+          <a:ext cx="0" cy="0"/>
+          <a:chOff x="0" y="0"/>
+          <a:chExt cx="0" cy="0"/>
+        </a:xfrm>
+      </p:grpSpPr>
+      <p:sp>
+        <p:nvSpPr>
+          <p:cNvPr id="2" name="Title 1">
+            <a:extLst>
+              <a:ext uri="{FF2B5EF4-FFF2-40B4-BE49-F238E27FC236}">
+                <a16:creationId xmlns:a16="http://schemas.microsoft.com/office/drawing/2014/main" id="{BC2AE0DA-EA8C-E9ED-1713-1A65853AE090}"/>
+              </a:ext>
+            </a:extLst>
+          </p:cNvPr>
+          <p:cNvSpPr>
+            <a:spLocks noGrp="1"/>
+          </p:cNvSpPr>
+          <p:nvPr>
+            <p:ph type="title"/>
+          </p:nvPr>
+        </p:nvSpPr>
+        <p:spPr>
+          <a:xfrm>
+            <a:off x="581193" y="729658"/>
+            <a:ext cx="11029616" cy="988332"/>
+          </a:xfrm>
+        </p:spPr>
+        <p:txBody>
+          <a:bodyPr anchor="b">
+            <a:normAutofit/>
+          </a:bodyPr>
+          <a:lstStyle/>
+          <a:p>
+            <a:r>
+              <a:rPr lang="en-GB" dirty="0"/>
+              <a:t>Different Ways of Applying Style in React</a:t>
+            </a:r>
+          </a:p>
+        </p:txBody>
+      </p:sp>
+      <p:sp>
+        <p:nvSpPr>
+          <p:cNvPr id="3" name="Content Placeholder 2">
+            <a:extLst>
+              <a:ext uri="{FF2B5EF4-FFF2-40B4-BE49-F238E27FC236}">
+                <a16:creationId xmlns:a16="http://schemas.microsoft.com/office/drawing/2014/main" id="{F239DB83-4352-AACF-BE20-64D0A59B6C94}"/>
+              </a:ext>
+            </a:extLst>
+          </p:cNvPr>
+          <p:cNvSpPr>
+            <a:spLocks noGrp="1"/>
+          </p:cNvSpPr>
+          <p:nvPr>
+            <p:ph sz="half" idx="1"/>
+          </p:nvPr>
+        </p:nvSpPr>
+        <p:spPr>
+          <a:xfrm>
+            <a:off x="581193" y="2228003"/>
+            <a:ext cx="5422390" cy="3633047"/>
+          </a:xfrm>
+        </p:spPr>
+        <p:txBody>
+          <a:bodyPr anchor="ctr">
+            <a:normAutofit/>
+          </a:bodyPr>
+          <a:lstStyle/>
+          <a:p>
+            <a:r>
+              <a:rPr lang="en-GB" b="1" dirty="0"/>
+              <a:t>Styled Components:</a:t>
+            </a:r>
+            <a:br>
+              <a:rPr lang="en-GB" b="1" dirty="0"/>
+            </a:br>
+            <a:r>
+              <a:rPr lang="en-GB" dirty="0"/>
+              <a:t>Styled-components library for writing CSS-in-JS.</a:t>
+            </a:r>
+          </a:p>
+          <a:p>
+            <a:r>
+              <a:rPr lang="en-GB" b="1" dirty="0"/>
+              <a:t>Pros</a:t>
+            </a:r>
+            <a:r>
+              <a:rPr lang="en-GB" dirty="0"/>
+              <a:t>: </a:t>
+            </a:r>
+            <a:br>
+              <a:rPr lang="en-GB" dirty="0"/>
+            </a:br>
+            <a:r>
+              <a:rPr lang="en-GB" dirty="0"/>
+              <a:t>Dynamic and component-scoped styling.</a:t>
+            </a:r>
+          </a:p>
+          <a:p>
+            <a:r>
+              <a:rPr lang="en-GB" b="1" dirty="0"/>
+              <a:t>Cons</a:t>
+            </a:r>
+            <a:r>
+              <a:rPr lang="en-GB" dirty="0"/>
+              <a:t>: </a:t>
+            </a:r>
+            <a:br>
+              <a:rPr lang="en-GB" dirty="0"/>
+            </a:br>
+            <a:r>
+              <a:rPr lang="en-GB" dirty="0"/>
+              <a:t>Increases bundle size and adds complexity.</a:t>
+            </a:r>
+            <a:br>
+              <a:rPr lang="en-GB" dirty="0"/>
+            </a:br>
+            <a:br>
+              <a:rPr lang="en-GB" dirty="0"/>
+            </a:br>
+            <a:r>
+              <a:rPr lang="en-GB" dirty="0"/>
+              <a:t>Demo…</a:t>
+            </a:r>
+          </a:p>
+          <a:p>
+            <a:endParaRPr lang="en-GB" b="1" dirty="0"/>
+          </a:p>
+        </p:txBody>
+      </p:sp>
+      <p:pic>
+        <p:nvPicPr>
+          <p:cNvPr id="5" name="Picture 4">
+            <a:extLst>
+              <a:ext uri="{FF2B5EF4-FFF2-40B4-BE49-F238E27FC236}">
+                <a16:creationId xmlns:a16="http://schemas.microsoft.com/office/drawing/2014/main" id="{2A87A000-3D56-E5E5-0CDC-25CF0B9FEF16}"/>
+              </a:ext>
+            </a:extLst>
+          </p:cNvPr>
+          <p:cNvPicPr>
+            <a:picLocks noChangeAspect="1"/>
+          </p:cNvPicPr>
+          <p:nvPr/>
+        </p:nvPicPr>
+        <p:blipFill>
+          <a:blip r:embed="rId3"/>
+          <a:stretch>
+            <a:fillRect/>
+          </a:stretch>
+        </p:blipFill>
+        <p:spPr>
+          <a:xfrm>
+            <a:off x="5394081" y="3642522"/>
+            <a:ext cx="6528289" cy="779671"/>
+          </a:xfrm>
+          <a:prstGeom prst="rect">
+            <a:avLst/>
+          </a:prstGeom>
+        </p:spPr>
+      </p:pic>
+    </p:spTree>
+    <p:extLst>
+      <p:ext uri="{BB962C8B-B14F-4D97-AF65-F5344CB8AC3E}">
+        <p14:creationId xmlns:p14="http://schemas.microsoft.com/office/powerpoint/2010/main" val="3278349884"/>
+      </p:ext>
+    </p:extLst>
+  </p:cSld>
+  <p:clrMapOvr>
+    <a:masterClrMapping/>
+  </p:clrMapOvr>
+</p:sld>
+</file>
+
+<file path=ppt/slides/slide7.xml><?xml version="1.0" encoding="utf-8"?>
 <p:sld xmlns:a="http://schemas.openxmlformats.org/drawingml/2006/main" xmlns:r="http://schemas.openxmlformats.org/officeDocument/2006/relationships" xmlns:p="http://schemas.openxmlformats.org/presentationml/2006/main">
   <p:cSld>
     <p:spTree>
@@ -6359,7 +6964,7 @@
           <a:p>
             <a:r>
               <a:rPr lang="en-GB" dirty="0"/>
-              <a:t>How HTTP Requests Work</a:t>
+              <a:t>Importing Images and Assets</a:t>
             </a:r>
           </a:p>
         </p:txBody>
@@ -6388,9 +6993,43 @@
         </p:spPr>
         <p:txBody>
           <a:bodyPr anchor="ctr">
-            <a:normAutofit fontScale="85000" lnSpcReduction="20000"/>
+            <a:normAutofit fontScale="92500" lnSpcReduction="10000"/>
           </a:bodyPr>
           <a:lstStyle/>
+          <a:p>
+            <a:r>
+              <a:rPr lang="en-GB" b="1" dirty="0"/>
+              <a:t>Importing Images</a:t>
+            </a:r>
+            <a:r>
+              <a:rPr lang="en-GB" dirty="0"/>
+              <a:t>: </a:t>
+            </a:r>
+            <a:br>
+              <a:rPr lang="en-GB" dirty="0"/>
+            </a:br>
+            <a:r>
+              <a:rPr lang="en-GB" dirty="0"/>
+              <a:t>Import images directly in JavaScript</a:t>
+            </a:r>
+          </a:p>
+          <a:p>
+            <a:r>
+              <a:rPr lang="en-GB" b="1" dirty="0"/>
+              <a:t>Using public Folder</a:t>
+            </a:r>
+            <a:r>
+              <a:rPr lang="en-GB" dirty="0"/>
+              <a:t>: </a:t>
+            </a:r>
+            <a:br>
+              <a:rPr lang="en-GB" dirty="0"/>
+            </a:br>
+            <a:r>
+              <a:rPr lang="en-GB" dirty="0"/>
+              <a:t>Place assets in the public folder and reference them</a:t>
+            </a:r>
+          </a:p>
           <a:p>
             <a:pPr>
               <a:buFont typeface="Arial" panose="020B0604020202020204" pitchFamily="34" charset="0"/>
@@ -6398,39 +7037,43 @@
             </a:pPr>
             <a:r>
               <a:rPr lang="en-GB" b="1" dirty="0"/>
-              <a:t>The Request-Response Cycle</a:t>
+              <a:t>When to Use Which</a:t>
             </a:r>
             <a:r>
               <a:rPr lang="en-GB" dirty="0"/>
               <a:t>:</a:t>
             </a:r>
-            <a:br>
-              <a:rPr lang="en-GB" dirty="0"/>
-            </a:br>
-            <a:br>
-              <a:rPr lang="en-GB" dirty="0"/>
-            </a:br>
+          </a:p>
+          <a:p>
+            <a:pPr marL="742950" lvl="1" indent="-285750">
+              <a:buFont typeface="Arial" panose="020B0604020202020204" pitchFamily="34" charset="0"/>
+              <a:buChar char="•"/>
+            </a:pPr>
+            <a:r>
+              <a:rPr lang="en-GB" b="1" dirty="0" err="1"/>
+              <a:t>src</a:t>
+            </a:r>
             <a:r>
               <a:rPr lang="en-GB" b="1" dirty="0"/>
-              <a:t>Request</a:t>
-            </a:r>
-            <a:r>
-              <a:rPr lang="en-GB" dirty="0"/>
-              <a:t>: Made by the client (browser or API tool) to request data.</a:t>
-            </a:r>
-            <a:br>
-              <a:rPr lang="en-GB" dirty="0"/>
-            </a:br>
-            <a:br>
-              <a:rPr lang="en-GB" dirty="0"/>
-            </a:br>
+              <a:t> Imports</a:t>
+            </a:r>
+            <a:r>
+              <a:rPr lang="en-GB" dirty="0"/>
+              <a:t>: Best for component-specific images.</a:t>
+            </a:r>
+          </a:p>
+          <a:p>
+            <a:pPr marL="742950" lvl="1" indent="-285750">
+              <a:buFont typeface="Arial" panose="020B0604020202020204" pitchFamily="34" charset="0"/>
+              <a:buChar char="•"/>
+            </a:pPr>
             <a:r>
               <a:rPr lang="en-GB" b="1" dirty="0"/>
-              <a:t>Response</a:t>
-            </a:r>
-            <a:r>
-              <a:rPr lang="en-GB" dirty="0"/>
-              <a:t>: Sent by the server, often in HTML, JSON, or another format.</a:t>
+              <a:t>public Folder</a:t>
+            </a:r>
+            <a:r>
+              <a:rPr lang="en-GB" dirty="0"/>
+              <a:t>: Use for images needed globally across the app.</a:t>
             </a:r>
           </a:p>
           <a:p>
@@ -6440,7 +7083,7 @@
             </a:pPr>
             <a:r>
               <a:rPr lang="en-GB" b="1" dirty="0"/>
-              <a:t>Components of an HTTP Request</a:t>
+              <a:t>Adding Other Assets</a:t>
             </a:r>
             <a:r>
               <a:rPr lang="en-GB" dirty="0"/>
@@ -6449,334 +7092,90 @@
             <a:br>
               <a:rPr lang="en-GB" dirty="0"/>
             </a:br>
-            <a:br>
-              <a:rPr lang="en-GB" dirty="0"/>
-            </a:br>
-            <a:r>
-              <a:rPr lang="en-GB" b="1" dirty="0"/>
-              <a:t>URL</a:t>
-            </a:r>
-            <a:r>
-              <a:rPr lang="en-GB" dirty="0"/>
-              <a:t>: The address of the resource.</a:t>
-            </a:r>
-            <a:br>
-              <a:rPr lang="en-GB" dirty="0"/>
-            </a:br>
-            <a:br>
-              <a:rPr lang="en-GB" dirty="0"/>
-            </a:br>
-            <a:r>
-              <a:rPr lang="en-GB" b="1" dirty="0"/>
-              <a:t>Method</a:t>
-            </a:r>
-            <a:r>
-              <a:rPr lang="en-GB" dirty="0"/>
-              <a:t>: GET, POST, etc.</a:t>
-            </a:r>
-            <a:br>
-              <a:rPr lang="en-GB" dirty="0"/>
-            </a:br>
-            <a:br>
-              <a:rPr lang="en-GB" dirty="0"/>
-            </a:br>
-            <a:r>
-              <a:rPr lang="en-GB" b="1" dirty="0"/>
-              <a:t>Headers</a:t>
-            </a:r>
-            <a:r>
-              <a:rPr lang="en-GB" dirty="0"/>
-              <a:t>: Additional information, like content type.</a:t>
-            </a:r>
-            <a:br>
-              <a:rPr lang="en-GB" dirty="0"/>
-            </a:br>
-            <a:br>
-              <a:rPr lang="en-GB" dirty="0"/>
-            </a:br>
-            <a:r>
-              <a:rPr lang="en-GB" b="1" dirty="0"/>
-              <a:t>Body</a:t>
-            </a:r>
-            <a:r>
-              <a:rPr lang="en-GB" dirty="0"/>
-              <a:t>: (Optional) Data sent with requests (mainly POST).</a:t>
-            </a:r>
-            <a:br>
-              <a:rPr lang="en-GB" dirty="0"/>
-            </a:br>
-            <a:br>
-              <a:rPr lang="en-GB" dirty="0"/>
-            </a:br>
-            <a:endParaRPr lang="en-GB" dirty="0"/>
-          </a:p>
-        </p:txBody>
-      </p:sp>
-      <p:sp>
-        <p:nvSpPr>
-          <p:cNvPr id="4" name="Content Placeholder 2">
+            <a:r>
+              <a:rPr lang="en-GB" dirty="0"/>
+              <a:t>Fonts, icons, and external resources can be imported similarly or linked in </a:t>
+            </a:r>
+            <a:r>
+              <a:rPr lang="en-GB" dirty="0" err="1"/>
+              <a:t>index.html</a:t>
+            </a:r>
+            <a:r>
+              <a:rPr lang="en-GB" dirty="0"/>
+              <a:t>.</a:t>
+            </a:r>
+          </a:p>
+          <a:p>
+            <a:pPr marL="0" indent="0">
+              <a:buNone/>
+            </a:pPr>
+            <a:r>
+              <a:rPr lang="en-GB" dirty="0"/>
+              <a:t>Demo…</a:t>
+            </a:r>
+          </a:p>
+        </p:txBody>
+      </p:sp>
+      <p:pic>
+        <p:nvPicPr>
+          <p:cNvPr id="6" name="Picture 5" descr="A black background with colorful text&#10;&#10;Description automatically generated">
             <a:extLst>
               <a:ext uri="{FF2B5EF4-FFF2-40B4-BE49-F238E27FC236}">
-                <a16:creationId xmlns:a16="http://schemas.microsoft.com/office/drawing/2014/main" id="{B9566883-B6C2-1BB9-ED2D-22C67D069BD3}"/>
+                <a16:creationId xmlns:a16="http://schemas.microsoft.com/office/drawing/2014/main" id="{3F4020E1-D088-F889-F5C8-4BB36BE51EFD}"/>
               </a:ext>
             </a:extLst>
           </p:cNvPr>
-          <p:cNvSpPr txBox="1">
-            <a:spLocks/>
-          </p:cNvSpPr>
+          <p:cNvPicPr>
+            <a:picLocks noChangeAspect="1"/>
+          </p:cNvPicPr>
           <p:nvPr/>
-        </p:nvSpPr>
-        <p:spPr>
-          <a:xfrm>
-            <a:off x="6096000" y="2228003"/>
-            <a:ext cx="5422390" cy="3633047"/>
+        </p:nvPicPr>
+        <p:blipFill>
+          <a:blip r:embed="rId3"/>
+          <a:stretch>
+            <a:fillRect/>
+          </a:stretch>
+        </p:blipFill>
+        <p:spPr>
+          <a:xfrm>
+            <a:off x="6856534" y="2552700"/>
+            <a:ext cx="3594100" cy="876300"/>
           </a:xfrm>
           <a:prstGeom prst="rect">
             <a:avLst/>
           </a:prstGeom>
         </p:spPr>
-        <p:txBody>
-          <a:bodyPr vert="horz" lIns="91440" tIns="45720" rIns="91440" bIns="45720" rtlCol="0" anchor="ctr">
-            <a:normAutofit/>
-          </a:bodyPr>
-          <a:lstStyle>
-            <a:lvl1pPr marL="306000" indent="-306000" algn="l" defTabSz="457200" rtl="0" eaLnBrk="1" latinLnBrk="0" hangingPunct="1">
-              <a:spcBef>
-                <a:spcPct val="20000"/>
-              </a:spcBef>
-              <a:spcAft>
-                <a:spcPts val="600"/>
-              </a:spcAft>
-              <a:buClr>
-                <a:schemeClr val="accent2"/>
-              </a:buClr>
-              <a:buSzPct val="92000"/>
-              <a:buFont typeface="Wingdings 2" panose="05020102010507070707" pitchFamily="18" charset="2"/>
-              <a:buChar char=""/>
-              <a:defRPr sz="1800" kern="1200">
-                <a:solidFill>
-                  <a:schemeClr val="tx2"/>
-                </a:solidFill>
-                <a:latin typeface="+mn-lt"/>
-                <a:ea typeface="+mn-ea"/>
-                <a:cs typeface="+mn-cs"/>
-              </a:defRPr>
-            </a:lvl1pPr>
-            <a:lvl2pPr marL="630000" indent="-306000" algn="l" defTabSz="457200" rtl="0" eaLnBrk="1" latinLnBrk="0" hangingPunct="1">
-              <a:spcBef>
-                <a:spcPct val="20000"/>
-              </a:spcBef>
-              <a:spcAft>
-                <a:spcPts val="600"/>
-              </a:spcAft>
-              <a:buClr>
-                <a:schemeClr val="accent2"/>
-              </a:buClr>
-              <a:buSzPct val="92000"/>
-              <a:buFont typeface="Wingdings 2" panose="05020102010507070707" pitchFamily="18" charset="2"/>
-              <a:buChar char=""/>
-              <a:defRPr sz="1600" kern="1200">
-                <a:solidFill>
-                  <a:schemeClr val="tx2"/>
-                </a:solidFill>
-                <a:latin typeface="+mn-lt"/>
-                <a:ea typeface="+mn-ea"/>
-                <a:cs typeface="+mn-cs"/>
-              </a:defRPr>
-            </a:lvl2pPr>
-            <a:lvl3pPr marL="900000" indent="-270000" algn="l" defTabSz="457200" rtl="0" eaLnBrk="1" latinLnBrk="0" hangingPunct="1">
-              <a:spcBef>
-                <a:spcPct val="20000"/>
-              </a:spcBef>
-              <a:spcAft>
-                <a:spcPts val="600"/>
-              </a:spcAft>
-              <a:buClr>
-                <a:schemeClr val="accent2"/>
-              </a:buClr>
-              <a:buSzPct val="92000"/>
-              <a:buFont typeface="Wingdings 2" panose="05020102010507070707" pitchFamily="18" charset="2"/>
-              <a:buChar char=""/>
-              <a:defRPr sz="1400" kern="1200">
-                <a:solidFill>
-                  <a:schemeClr val="tx2"/>
-                </a:solidFill>
-                <a:latin typeface="+mn-lt"/>
-                <a:ea typeface="+mn-ea"/>
-                <a:cs typeface="+mn-cs"/>
-              </a:defRPr>
-            </a:lvl3pPr>
-            <a:lvl4pPr marL="1242000" indent="-234000" algn="l" defTabSz="457200" rtl="0" eaLnBrk="1" latinLnBrk="0" hangingPunct="1">
-              <a:spcBef>
-                <a:spcPct val="20000"/>
-              </a:spcBef>
-              <a:spcAft>
-                <a:spcPts val="600"/>
-              </a:spcAft>
-              <a:buClr>
-                <a:schemeClr val="accent2"/>
-              </a:buClr>
-              <a:buSzPct val="92000"/>
-              <a:buFont typeface="Wingdings 2" panose="05020102010507070707" pitchFamily="18" charset="2"/>
-              <a:buChar char=""/>
-              <a:defRPr sz="1200" kern="1200">
-                <a:solidFill>
-                  <a:schemeClr val="tx2"/>
-                </a:solidFill>
-                <a:latin typeface="+mn-lt"/>
-                <a:ea typeface="+mn-ea"/>
-                <a:cs typeface="+mn-cs"/>
-              </a:defRPr>
-            </a:lvl4pPr>
-            <a:lvl5pPr marL="1602000" indent="-234000" algn="l" defTabSz="457200" rtl="0" eaLnBrk="1" latinLnBrk="0" hangingPunct="1">
-              <a:spcBef>
-                <a:spcPct val="20000"/>
-              </a:spcBef>
-              <a:spcAft>
-                <a:spcPts val="600"/>
-              </a:spcAft>
-              <a:buClr>
-                <a:schemeClr val="accent2"/>
-              </a:buClr>
-              <a:buSzPct val="92000"/>
-              <a:buFont typeface="Wingdings 2" panose="05020102010507070707" pitchFamily="18" charset="2"/>
-              <a:buChar char=""/>
-              <a:defRPr sz="1200" kern="1200">
-                <a:solidFill>
-                  <a:schemeClr val="tx2"/>
-                </a:solidFill>
-                <a:latin typeface="+mn-lt"/>
-                <a:ea typeface="+mn-ea"/>
-                <a:cs typeface="+mn-cs"/>
-              </a:defRPr>
-            </a:lvl5pPr>
-            <a:lvl6pPr marL="1900000" indent="-228600" algn="l" defTabSz="457200" rtl="0" eaLnBrk="1" latinLnBrk="0" hangingPunct="1">
-              <a:spcBef>
-                <a:spcPct val="20000"/>
-              </a:spcBef>
-              <a:spcAft>
-                <a:spcPts val="600"/>
-              </a:spcAft>
-              <a:buClr>
-                <a:schemeClr val="accent2"/>
-              </a:buClr>
-              <a:buSzPct val="92000"/>
-              <a:buFont typeface="Wingdings 2" panose="05020102010507070707" pitchFamily="18" charset="2"/>
-              <a:buChar char=""/>
-              <a:defRPr sz="1200" kern="1200">
-                <a:solidFill>
-                  <a:schemeClr val="tx2"/>
-                </a:solidFill>
-                <a:latin typeface="+mn-lt"/>
-                <a:ea typeface="+mn-ea"/>
-                <a:cs typeface="+mn-cs"/>
-              </a:defRPr>
-            </a:lvl6pPr>
-            <a:lvl7pPr marL="2200000" indent="-228600" algn="l" defTabSz="457200" rtl="0" eaLnBrk="1" latinLnBrk="0" hangingPunct="1">
-              <a:spcBef>
-                <a:spcPct val="20000"/>
-              </a:spcBef>
-              <a:spcAft>
-                <a:spcPts val="600"/>
-              </a:spcAft>
-              <a:buClr>
-                <a:schemeClr val="accent2"/>
-              </a:buClr>
-              <a:buSzPct val="92000"/>
-              <a:buFont typeface="Wingdings 2" panose="05020102010507070707" pitchFamily="18" charset="2"/>
-              <a:buChar char=""/>
-              <a:defRPr sz="1200" kern="1200">
-                <a:solidFill>
-                  <a:schemeClr val="tx2"/>
-                </a:solidFill>
-                <a:latin typeface="+mn-lt"/>
-                <a:ea typeface="+mn-ea"/>
-                <a:cs typeface="+mn-cs"/>
-              </a:defRPr>
-            </a:lvl7pPr>
-            <a:lvl8pPr marL="2500000" indent="-228600" algn="l" defTabSz="457200" rtl="0" eaLnBrk="1" latinLnBrk="0" hangingPunct="1">
-              <a:spcBef>
-                <a:spcPct val="20000"/>
-              </a:spcBef>
-              <a:spcAft>
-                <a:spcPts val="600"/>
-              </a:spcAft>
-              <a:buClr>
-                <a:schemeClr val="accent2"/>
-              </a:buClr>
-              <a:buSzPct val="92000"/>
-              <a:buFont typeface="Wingdings 2" panose="05020102010507070707" pitchFamily="18" charset="2"/>
-              <a:buChar char=""/>
-              <a:defRPr sz="1200" kern="1200">
-                <a:solidFill>
-                  <a:schemeClr val="tx2"/>
-                </a:solidFill>
-                <a:latin typeface="+mn-lt"/>
-                <a:ea typeface="+mn-ea"/>
-                <a:cs typeface="+mn-cs"/>
-              </a:defRPr>
-            </a:lvl8pPr>
-            <a:lvl9pPr marL="2800000" indent="-228600" algn="l" defTabSz="457200" rtl="0" eaLnBrk="1" latinLnBrk="0" hangingPunct="1">
-              <a:spcBef>
-                <a:spcPct val="20000"/>
-              </a:spcBef>
-              <a:spcAft>
-                <a:spcPts val="600"/>
-              </a:spcAft>
-              <a:buClr>
-                <a:schemeClr val="accent2"/>
-              </a:buClr>
-              <a:buSzPct val="92000"/>
-              <a:buFont typeface="Wingdings 2" panose="05020102010507070707" pitchFamily="18" charset="2"/>
-              <a:buChar char=""/>
-              <a:defRPr sz="1200" kern="1200">
-                <a:solidFill>
-                  <a:schemeClr val="tx2"/>
-                </a:solidFill>
-                <a:latin typeface="+mn-lt"/>
-                <a:ea typeface="+mn-ea"/>
-                <a:cs typeface="+mn-cs"/>
-              </a:defRPr>
-            </a:lvl9pPr>
-          </a:lstStyle>
-          <a:p>
-            <a:pPr marL="0" indent="0">
-              <a:buNone/>
-            </a:pPr>
-            <a:r>
-              <a:rPr lang="en-GB" sz="1500" dirty="0"/>
-              <a:t>Example:</a:t>
-            </a:r>
-            <a:endParaRPr lang="en-GB" sz="1500" dirty="0">
-              <a:hlinkClick r:id="rId3">
-                <a:extLst>
-                  <a:ext uri="{A12FA001-AC4F-418D-AE19-62706E023703}">
-                    <ahyp:hlinkClr xmlns:ahyp="http://schemas.microsoft.com/office/drawing/2018/hyperlinkcolor" val="tx"/>
-                  </a:ext>
-                </a:extLst>
-              </a:hlinkClick>
-            </a:endParaRPr>
-          </a:p>
-          <a:p>
-            <a:pPr marL="0" indent="0">
-              <a:buNone/>
-            </a:pPr>
-            <a:r>
-              <a:rPr lang="en-GB" sz="1500" dirty="0">
-                <a:hlinkClick r:id="rId3">
-                  <a:extLst>
-                    <a:ext uri="{A12FA001-AC4F-418D-AE19-62706E023703}">
-                      <ahyp:hlinkClr xmlns:ahyp="http://schemas.microsoft.com/office/drawing/2018/hyperlinkcolor" val="tx"/>
-                    </a:ext>
-                  </a:extLst>
-                </a:hlinkClick>
-              </a:rPr>
-              <a:t>https://www.oreilly.com/library/view/restful-java-web/9781788294041/1889f99d-f907-41c3-a0f0-925bbf1d3825.xhtml</a:t>
-            </a:r>
-            <a:endParaRPr lang="en-GB" sz="1500" dirty="0"/>
-          </a:p>
-        </p:txBody>
-      </p:sp>
+      </p:pic>
+      <p:pic>
+        <p:nvPicPr>
+          <p:cNvPr id="8" name="Picture 7">
+            <a:extLst>
+              <a:ext uri="{FF2B5EF4-FFF2-40B4-BE49-F238E27FC236}">
+                <a16:creationId xmlns:a16="http://schemas.microsoft.com/office/drawing/2014/main" id="{CF2BF3C7-9E20-570F-2FDC-6F871193BC03}"/>
+              </a:ext>
+            </a:extLst>
+          </p:cNvPr>
+          <p:cNvPicPr>
+            <a:picLocks noChangeAspect="1"/>
+          </p:cNvPicPr>
+          <p:nvPr/>
+        </p:nvPicPr>
+        <p:blipFill>
+          <a:blip r:embed="rId4"/>
+          <a:stretch>
+            <a:fillRect/>
+          </a:stretch>
+        </p:blipFill>
+        <p:spPr>
+          <a:xfrm>
+            <a:off x="6856534" y="4644711"/>
+            <a:ext cx="4330700" cy="495300"/>
+          </a:xfrm>
+          <a:prstGeom prst="rect">
+            <a:avLst/>
+          </a:prstGeom>
+        </p:spPr>
+      </p:pic>
     </p:spTree>
     <p:extLst>
       <p:ext uri="{BB962C8B-B14F-4D97-AF65-F5344CB8AC3E}">
@@ -6790,7 +7189,7 @@
 </p:sld>
 </file>
 
-<file path=ppt/slides/slide5.xml><?xml version="1.0" encoding="utf-8"?>
+<file path=ppt/slides/slide8.xml><?xml version="1.0" encoding="utf-8"?>
 <p:sld xmlns:a="http://schemas.openxmlformats.org/drawingml/2006/main" xmlns:r="http://schemas.openxmlformats.org/officeDocument/2006/relationships" xmlns:p="http://schemas.openxmlformats.org/presentationml/2006/main">
   <p:cSld>
     <p:spTree>
@@ -6843,8 +7242,13 @@
           <a:p>
             <a:r>
               <a:rPr lang="en-GB" dirty="0"/>
-              <a:t>Types of HTTP Requests</a:t>
-            </a:r>
+              <a:t>React Hooks: </a:t>
+            </a:r>
+            <a:r>
+              <a:rPr lang="en-GB" dirty="0" err="1"/>
+              <a:t>useState</a:t>
+            </a:r>
+            <a:endParaRPr lang="en-GB" dirty="0"/>
           </a:p>
         </p:txBody>
       </p:sp>
@@ -6878,55 +7282,22 @@
           <a:p>
             <a:r>
               <a:rPr lang="en-GB" b="1" dirty="0"/>
-              <a:t>GET</a:t>
-            </a:r>
-            <a:r>
-              <a:rPr lang="en-GB" dirty="0"/>
-              <a:t>: Retrieves data (read-only).</a:t>
-            </a:r>
-          </a:p>
-          <a:p>
+              <a:t>What is </a:t>
+            </a:r>
+            <a:r>
+              <a:rPr lang="en-GB" b="1" dirty="0" err="1"/>
+              <a:t>useState</a:t>
+            </a:r>
             <a:r>
               <a:rPr lang="en-GB" b="1" dirty="0"/>
-              <a:t>POST</a:t>
-            </a:r>
-            <a:r>
-              <a:rPr lang="en-GB" dirty="0"/>
-              <a:t>: Sends new data to the server.</a:t>
-            </a:r>
-          </a:p>
-          <a:p>
-            <a:r>
+              <a:t>?</a:t>
+            </a:r>
+            <a:br>
               <a:rPr lang="en-GB" b="1" dirty="0"/>
-              <a:t>PUT</a:t>
-            </a:r>
-            <a:r>
-              <a:rPr lang="en-GB" dirty="0"/>
-              <a:t>: Updates existing data.</a:t>
-            </a:r>
-          </a:p>
-          <a:p>
-            <a:r>
-              <a:rPr lang="en-GB" b="1" dirty="0"/>
-              <a:t>DELETE</a:t>
-            </a:r>
-            <a:r>
-              <a:rPr lang="en-GB" dirty="0"/>
-              <a:t>: Removes data.</a:t>
-            </a:r>
-            <a:br>
-              <a:rPr lang="en-GB" dirty="0"/>
             </a:br>
-            <a:br>
-              <a:rPr lang="en-GB" dirty="0"/>
-            </a:br>
-            <a:r>
-              <a:rPr lang="en-GB" b="1" dirty="0"/>
-              <a:t>Example</a:t>
-            </a:r>
-            <a:r>
-              <a:rPr lang="en-GB" dirty="0"/>
-              <a:t>:</a:t>
+            <a:r>
+              <a:rPr lang="en-GB" dirty="0"/>
+              <a:t>A React Hook for adding state to functional components.</a:t>
             </a:r>
           </a:p>
           <a:p>
@@ -6935,25 +7306,87 @@
               <a:buChar char="•"/>
             </a:pPr>
             <a:r>
-              <a:rPr lang="en-GB" dirty="0"/>
-              <a:t>GET request to fetch weather data from an API.</a:t>
-            </a:r>
-          </a:p>
-          <a:p>
-            <a:pPr>
-              <a:buFont typeface="Arial" panose="020B0604020202020204" pitchFamily="34" charset="0"/>
-              <a:buChar char="•"/>
-            </a:pPr>
-            <a:r>
-              <a:rPr lang="en-GB" dirty="0"/>
-              <a:t>POST request to submit a form.</a:t>
+              <a:rPr lang="en-GB" b="1" dirty="0"/>
+              <a:t>Using </a:t>
+            </a:r>
+            <a:r>
+              <a:rPr lang="en-GB" b="1" dirty="0" err="1"/>
+              <a:t>useState</a:t>
+            </a:r>
+            <a:r>
+              <a:rPr lang="en-GB" dirty="0"/>
+              <a:t>:</a:t>
+            </a:r>
+            <a:br>
+              <a:rPr lang="en-GB" dirty="0"/>
+            </a:br>
+            <a:br>
+              <a:rPr lang="en-GB" dirty="0"/>
+            </a:br>
+            <a:r>
+              <a:rPr lang="en-GB" dirty="0" err="1"/>
+              <a:t>useState</a:t>
+            </a:r>
+            <a:r>
+              <a:rPr lang="en-GB" dirty="0"/>
+              <a:t> returns a state variable and a function </a:t>
+            </a:r>
+            <a:br>
+              <a:rPr lang="en-GB" dirty="0"/>
+            </a:br>
+            <a:r>
+              <a:rPr lang="en-GB" dirty="0"/>
+              <a:t>to update it.</a:t>
+            </a:r>
+            <a:br>
+              <a:rPr lang="en-GB" dirty="0"/>
+            </a:br>
+            <a:br>
+              <a:rPr lang="en-GB" dirty="0"/>
+            </a:br>
+            <a:r>
+              <a:rPr lang="en-GB" dirty="0"/>
+              <a:t>Allows reactivity, updating the UI when state changes.</a:t>
             </a:r>
           </a:p>
           <a:p>
             <a:endParaRPr lang="en-GB" dirty="0"/>
           </a:p>
-        </p:txBody>
-      </p:sp>
+          <a:p>
+            <a:endParaRPr lang="en-GB" dirty="0"/>
+          </a:p>
+        </p:txBody>
+      </p:sp>
+      <p:pic>
+        <p:nvPicPr>
+          <p:cNvPr id="5" name="Picture 4" descr="A computer screen with text on it&#10;&#10;Description automatically generated">
+            <a:extLst>
+              <a:ext uri="{FF2B5EF4-FFF2-40B4-BE49-F238E27FC236}">
+                <a16:creationId xmlns:a16="http://schemas.microsoft.com/office/drawing/2014/main" id="{3D5855D4-3FEE-8E48-CAFE-A80F4D795804}"/>
+              </a:ext>
+            </a:extLst>
+          </p:cNvPr>
+          <p:cNvPicPr>
+            <a:picLocks noChangeAspect="1"/>
+          </p:cNvPicPr>
+          <p:nvPr/>
+        </p:nvPicPr>
+        <p:blipFill>
+          <a:blip r:embed="rId3"/>
+          <a:stretch>
+            <a:fillRect/>
+          </a:stretch>
+        </p:blipFill>
+        <p:spPr>
+          <a:xfrm>
+            <a:off x="5828399" y="2471884"/>
+            <a:ext cx="6117417" cy="2668127"/>
+          </a:xfrm>
+          <a:prstGeom prst="rect">
+            <a:avLst/>
+          </a:prstGeom>
+        </p:spPr>
+      </p:pic>
     </p:spTree>
     <p:extLst>
       <p:ext uri="{BB962C8B-B14F-4D97-AF65-F5344CB8AC3E}">
@@ -6967,7 +7400,7 @@
 </p:sld>
 </file>
 
-<file path=ppt/slides/slide6.xml><?xml version="1.0" encoding="utf-8"?>
+<file path=ppt/slides/slide9.xml><?xml version="1.0" encoding="utf-8"?>
 <p:sld xmlns:a="http://schemas.openxmlformats.org/drawingml/2006/main" xmlns:r="http://schemas.openxmlformats.org/officeDocument/2006/relationships" xmlns:p="http://schemas.openxmlformats.org/presentationml/2006/main">
   <p:cSld>
     <p:spTree>
@@ -7020,8 +7453,13 @@
           <a:p>
             <a:r>
               <a:rPr lang="en-GB" dirty="0"/>
-              <a:t>What is Postman?</a:t>
-            </a:r>
+              <a:t>React Hooks: </a:t>
+            </a:r>
+            <a:r>
+              <a:rPr lang="en-GB" dirty="0" err="1"/>
+              <a:t>useEffect</a:t>
+            </a:r>
+            <a:endParaRPr lang="en-GB" dirty="0"/>
           </a:p>
         </p:txBody>
       </p:sp>
@@ -7053,440 +7491,62 @@
           </a:bodyPr>
           <a:lstStyle/>
           <a:p>
-            <a:pPr>
-              <a:buFont typeface="Arial" panose="020B0604020202020204" pitchFamily="34" charset="0"/>
-              <a:buChar char="•"/>
-            </a:pPr>
             <a:r>
               <a:rPr lang="en-GB" b="1" dirty="0"/>
-              <a:t>Postman</a:t>
-            </a:r>
-            <a:r>
-              <a:rPr lang="en-GB" dirty="0"/>
-              <a:t> is a powerful tool for testing APIs and making HTTP requests.</a:t>
-            </a:r>
-          </a:p>
-          <a:p>
-            <a:pPr>
-              <a:buFont typeface="Arial" panose="020B0604020202020204" pitchFamily="34" charset="0"/>
-              <a:buChar char="•"/>
-            </a:pPr>
+              <a:t>What is </a:t>
+            </a:r>
+            <a:r>
+              <a:rPr lang="en-GB" b="1" dirty="0" err="1"/>
+              <a:t>useEffect</a:t>
+            </a:r>
             <a:r>
               <a:rPr lang="en-GB" b="1" dirty="0"/>
-              <a:t>Key Features</a:t>
-            </a:r>
-            <a:r>
-              <a:rPr lang="en-GB" dirty="0"/>
+              <a:t>?</a:t>
+            </a:r>
+            <a:br>
+              <a:rPr lang="en-GB" b="1" dirty="0"/>
+            </a:br>
+            <a:r>
+              <a:rPr lang="en-GB" dirty="0"/>
+              <a:t>A hook for performing side effects in functional components, such as fetching data, setting up subscriptions, or manually updating the DOM.</a:t>
+            </a:r>
+          </a:p>
+          <a:p>
+            <a:r>
+              <a:rPr lang="en-GB" b="1" dirty="0"/>
+              <a:t>Using </a:t>
+            </a:r>
+            <a:r>
+              <a:rPr lang="en-GB" b="1" dirty="0" err="1"/>
+              <a:t>useEffect</a:t>
+            </a:r>
+            <a:r>
+              <a:rPr lang="en-GB" b="1" dirty="0"/>
               <a:t>:</a:t>
             </a:r>
             <a:br>
-              <a:rPr lang="en-GB" dirty="0"/>
+              <a:rPr lang="en-GB" b="1" dirty="0"/>
             </a:br>
+            <a:r>
+              <a:rPr lang="en-GB" dirty="0"/>
+              <a:t>The second argument, [], is a dependency array. When empty, the effect runs only once after the initial render.</a:t>
+            </a:r>
             <a:br>
               <a:rPr lang="en-GB" dirty="0"/>
             </a:br>
             <a:r>
               <a:rPr lang="en-GB" dirty="0"/>
-              <a:t>Send different types of requests (GET, POST, PUT).</a:t>
-            </a:r>
-            <a:br>
-              <a:rPr lang="en-GB" dirty="0"/>
-            </a:br>
-            <a:br>
-              <a:rPr lang="en-GB" dirty="0"/>
-            </a:br>
-            <a:r>
-              <a:rPr lang="en-GB" dirty="0"/>
-              <a:t>Test and visualize responses.</a:t>
-            </a:r>
-            <a:br>
-              <a:rPr lang="en-GB" dirty="0"/>
-            </a:br>
-            <a:br>
-              <a:rPr lang="en-GB" dirty="0"/>
-            </a:br>
-            <a:r>
-              <a:rPr lang="en-GB" dirty="0"/>
-              <a:t>Set headers, parameters, and body data.</a:t>
-            </a:r>
-          </a:p>
-          <a:p>
-            <a:pPr>
-              <a:buFont typeface="Arial" panose="020B0604020202020204" pitchFamily="34" charset="0"/>
-              <a:buChar char="•"/>
-            </a:pPr>
-            <a:r>
-              <a:rPr lang="en-GB" b="1" dirty="0"/>
-              <a:t>Why use </a:t>
-            </a:r>
-            <a:r>
-              <a:rPr lang="en-GB" b="1" dirty="0" err="1"/>
-              <a:t>it?</a:t>
-            </a:r>
-            <a:r>
-              <a:rPr lang="en-GB" dirty="0" err="1"/>
-              <a:t>Makes</a:t>
-            </a:r>
-            <a:r>
-              <a:rPr lang="en-GB" dirty="0"/>
-              <a:t> working with APIs easier without writing code.</a:t>
+              <a:t>Effects can be re-run when dependencies in the array change.</a:t>
             </a:r>
           </a:p>
         </p:txBody>
       </p:sp>
       <p:pic>
         <p:nvPicPr>
-          <p:cNvPr id="1026" name="Picture 2">
+          <p:cNvPr id="5" name="Picture 4" descr="A computer screen with white text&#10;&#10;Description automatically generated">
             <a:extLst>
               <a:ext uri="{FF2B5EF4-FFF2-40B4-BE49-F238E27FC236}">
-                <a16:creationId xmlns:a16="http://schemas.microsoft.com/office/drawing/2014/main" id="{F6487D03-C702-934E-5AF9-83465B16A3FD}"/>
-              </a:ext>
-            </a:extLst>
-          </p:cNvPr>
-          <p:cNvPicPr>
-            <a:picLocks noChangeAspect="1" noChangeArrowheads="1"/>
-          </p:cNvPicPr>
-          <p:nvPr/>
-        </p:nvPicPr>
-        <p:blipFill>
-          <a:blip r:embed="rId3">
-            <a:extLst>
-              <a:ext uri="{28A0092B-C50C-407E-A947-70E740481C1C}">
-                <a14:useLocalDpi xmlns:a14="http://schemas.microsoft.com/office/drawing/2010/main" val="0"/>
-              </a:ext>
-            </a:extLst>
-          </a:blip>
-          <a:srcRect/>
-          <a:stretch>
-            <a:fillRect/>
-          </a:stretch>
-        </p:blipFill>
-        <p:spPr bwMode="auto">
-          <a:xfrm>
-            <a:off x="6670920" y="3096846"/>
-            <a:ext cx="4548066" cy="1380293"/>
-          </a:xfrm>
-          <a:prstGeom prst="rect">
-            <a:avLst/>
-          </a:prstGeom>
-          <a:noFill/>
-          <a:extLst>
-            <a:ext uri="{909E8E84-426E-40DD-AFC4-6F175D3DCCD1}">
-              <a14:hiddenFill xmlns:a14="http://schemas.microsoft.com/office/drawing/2010/main">
-                <a:solidFill>
-                  <a:srgbClr val="FFFFFF"/>
-                </a:solidFill>
-              </a14:hiddenFill>
-            </a:ext>
-          </a:extLst>
-        </p:spPr>
-      </p:pic>
-    </p:spTree>
-    <p:extLst>
-      <p:ext uri="{BB962C8B-B14F-4D97-AF65-F5344CB8AC3E}">
-        <p14:creationId xmlns:p14="http://schemas.microsoft.com/office/powerpoint/2010/main" val="2497984633"/>
-      </p:ext>
-    </p:extLst>
-  </p:cSld>
-  <p:clrMapOvr>
-    <a:masterClrMapping/>
-  </p:clrMapOvr>
-</p:sld>
-</file>
-
-<file path=ppt/slides/slide7.xml><?xml version="1.0" encoding="utf-8"?>
-<p:sld xmlns:a="http://schemas.openxmlformats.org/drawingml/2006/main" xmlns:r="http://schemas.openxmlformats.org/officeDocument/2006/relationships" xmlns:p="http://schemas.openxmlformats.org/presentationml/2006/main">
-  <p:cSld>
-    <p:spTree>
-      <p:nvGrpSpPr>
-        <p:cNvPr id="1" name="">
-          <a:extLst>
-            <a:ext uri="{FF2B5EF4-FFF2-40B4-BE49-F238E27FC236}">
-              <a16:creationId xmlns:a16="http://schemas.microsoft.com/office/drawing/2014/main" id="{DC57E627-D464-8A07-2D07-8862467C1A30}"/>
-            </a:ext>
-          </a:extLst>
-        </p:cNvPr>
-        <p:cNvGrpSpPr/>
-        <p:nvPr/>
-      </p:nvGrpSpPr>
-      <p:grpSpPr>
-        <a:xfrm>
-          <a:off x="0" y="0"/>
-          <a:ext cx="0" cy="0"/>
-          <a:chOff x="0" y="0"/>
-          <a:chExt cx="0" cy="0"/>
-        </a:xfrm>
-      </p:grpSpPr>
-      <p:sp>
-        <p:nvSpPr>
-          <p:cNvPr id="2" name="Title 1">
-            <a:extLst>
-              <a:ext uri="{FF2B5EF4-FFF2-40B4-BE49-F238E27FC236}">
-                <a16:creationId xmlns:a16="http://schemas.microsoft.com/office/drawing/2014/main" id="{DA72A8DE-E7D4-1852-9E9A-147009DA5F90}"/>
-              </a:ext>
-            </a:extLst>
-          </p:cNvPr>
-          <p:cNvSpPr>
-            <a:spLocks noGrp="1"/>
-          </p:cNvSpPr>
-          <p:nvPr>
-            <p:ph type="title"/>
-          </p:nvPr>
-        </p:nvSpPr>
-        <p:spPr>
-          <a:xfrm>
-            <a:off x="581193" y="729658"/>
-            <a:ext cx="11029616" cy="988332"/>
-          </a:xfrm>
-        </p:spPr>
-        <p:txBody>
-          <a:bodyPr anchor="b">
-            <a:normAutofit/>
-          </a:bodyPr>
-          <a:lstStyle/>
-          <a:p>
-            <a:r>
-              <a:rPr lang="en-GB" dirty="0"/>
-              <a:t>Using Postman for Basic HTTP Requests</a:t>
-            </a:r>
-          </a:p>
-        </p:txBody>
-      </p:sp>
-      <p:sp>
-        <p:nvSpPr>
-          <p:cNvPr id="3" name="Content Placeholder 2">
-            <a:extLst>
-              <a:ext uri="{FF2B5EF4-FFF2-40B4-BE49-F238E27FC236}">
-                <a16:creationId xmlns:a16="http://schemas.microsoft.com/office/drawing/2014/main" id="{0FBD3432-E889-6FB6-BC37-E865B56F74F3}"/>
-              </a:ext>
-            </a:extLst>
-          </p:cNvPr>
-          <p:cNvSpPr>
-            <a:spLocks noGrp="1"/>
-          </p:cNvSpPr>
-          <p:nvPr>
-            <p:ph sz="half" idx="1"/>
-          </p:nvPr>
-        </p:nvSpPr>
-        <p:spPr>
-          <a:xfrm>
-            <a:off x="581193" y="2228003"/>
-            <a:ext cx="5422390" cy="3633047"/>
-          </a:xfrm>
-        </p:spPr>
-        <p:txBody>
-          <a:bodyPr anchor="ctr">
-            <a:normAutofit/>
-          </a:bodyPr>
-          <a:lstStyle/>
-          <a:p>
-            <a:pPr>
-              <a:buFont typeface="Arial" panose="020B0604020202020204" pitchFamily="34" charset="0"/>
-              <a:buChar char="•"/>
-            </a:pPr>
-            <a:r>
-              <a:rPr lang="en-GB" b="1" dirty="0"/>
-              <a:t>Step 1</a:t>
-            </a:r>
-            <a:r>
-              <a:rPr lang="en-GB" dirty="0"/>
-              <a:t>: Install Postman from the official website.</a:t>
-            </a:r>
-          </a:p>
-          <a:p>
-            <a:pPr>
-              <a:buFont typeface="Arial" panose="020B0604020202020204" pitchFamily="34" charset="0"/>
-              <a:buChar char="•"/>
-            </a:pPr>
-            <a:r>
-              <a:rPr lang="en-GB" b="1" dirty="0"/>
-              <a:t>Step 2</a:t>
-            </a:r>
-            <a:r>
-              <a:rPr lang="en-GB" dirty="0"/>
-              <a:t>: Create a new request and set the method (GET, POST).</a:t>
-            </a:r>
-          </a:p>
-          <a:p>
-            <a:pPr>
-              <a:buFont typeface="Arial" panose="020B0604020202020204" pitchFamily="34" charset="0"/>
-              <a:buChar char="•"/>
-            </a:pPr>
-            <a:r>
-              <a:rPr lang="en-GB" b="1" dirty="0"/>
-              <a:t>Step 3</a:t>
-            </a:r>
-            <a:r>
-              <a:rPr lang="en-GB" dirty="0"/>
-              <a:t>: Enter the URL of the API endpoint.</a:t>
-            </a:r>
-          </a:p>
-          <a:p>
-            <a:pPr>
-              <a:buFont typeface="Arial" panose="020B0604020202020204" pitchFamily="34" charset="0"/>
-              <a:buChar char="•"/>
-            </a:pPr>
-            <a:r>
-              <a:rPr lang="en-GB" b="1" dirty="0"/>
-              <a:t>Step 4</a:t>
-            </a:r>
-            <a:r>
-              <a:rPr lang="en-GB" dirty="0"/>
-              <a:t>: Send the request and view the response (in JSON or other formats).</a:t>
-            </a:r>
-            <a:br>
-              <a:rPr lang="en-GB" dirty="0"/>
-            </a:br>
-            <a:br>
-              <a:rPr lang="en-GB" dirty="0"/>
-            </a:br>
-            <a:r>
-              <a:rPr lang="en-GB" dirty="0"/>
-              <a:t>demo…</a:t>
-            </a:r>
-          </a:p>
-        </p:txBody>
-      </p:sp>
-    </p:spTree>
-    <p:extLst>
-      <p:ext uri="{BB962C8B-B14F-4D97-AF65-F5344CB8AC3E}">
-        <p14:creationId xmlns:p14="http://schemas.microsoft.com/office/powerpoint/2010/main" val="2025468562"/>
-      </p:ext>
-    </p:extLst>
-  </p:cSld>
-  <p:clrMapOvr>
-    <a:masterClrMapping/>
-  </p:clrMapOvr>
-</p:sld>
-</file>
-
-<file path=ppt/slides/slide8.xml><?xml version="1.0" encoding="utf-8"?>
-<p:sld xmlns:a="http://schemas.openxmlformats.org/drawingml/2006/main" xmlns:r="http://schemas.openxmlformats.org/officeDocument/2006/relationships" xmlns:p="http://schemas.openxmlformats.org/presentationml/2006/main">
-  <p:cSld>
-    <p:spTree>
-      <p:nvGrpSpPr>
-        <p:cNvPr id="1" name="">
-          <a:extLst>
-            <a:ext uri="{FF2B5EF4-FFF2-40B4-BE49-F238E27FC236}">
-              <a16:creationId xmlns:a16="http://schemas.microsoft.com/office/drawing/2014/main" id="{8228EA1F-757A-0CAD-82A5-0D0564C6F3BE}"/>
-            </a:ext>
-          </a:extLst>
-        </p:cNvPr>
-        <p:cNvGrpSpPr/>
-        <p:nvPr/>
-      </p:nvGrpSpPr>
-      <p:grpSpPr>
-        <a:xfrm>
-          <a:off x="0" y="0"/>
-          <a:ext cx="0" cy="0"/>
-          <a:chOff x="0" y="0"/>
-          <a:chExt cx="0" cy="0"/>
-        </a:xfrm>
-      </p:grpSpPr>
-      <p:sp>
-        <p:nvSpPr>
-          <p:cNvPr id="2" name="Title 1">
-            <a:extLst>
-              <a:ext uri="{FF2B5EF4-FFF2-40B4-BE49-F238E27FC236}">
-                <a16:creationId xmlns:a16="http://schemas.microsoft.com/office/drawing/2014/main" id="{758C4B6C-C56E-4369-84BB-5EB567217E0E}"/>
-              </a:ext>
-            </a:extLst>
-          </p:cNvPr>
-          <p:cNvSpPr>
-            <a:spLocks noGrp="1"/>
-          </p:cNvSpPr>
-          <p:nvPr>
-            <p:ph type="title"/>
-          </p:nvPr>
-        </p:nvSpPr>
-        <p:spPr>
-          <a:xfrm>
-            <a:off x="581193" y="729658"/>
-            <a:ext cx="11029616" cy="988332"/>
-          </a:xfrm>
-        </p:spPr>
-        <p:txBody>
-          <a:bodyPr anchor="b">
-            <a:normAutofit/>
-          </a:bodyPr>
-          <a:lstStyle/>
-          <a:p>
-            <a:r>
-              <a:rPr lang="en-GB" dirty="0"/>
-              <a:t>What is JSON?</a:t>
-            </a:r>
-          </a:p>
-        </p:txBody>
-      </p:sp>
-      <p:sp>
-        <p:nvSpPr>
-          <p:cNvPr id="3" name="Content Placeholder 2">
-            <a:extLst>
-              <a:ext uri="{FF2B5EF4-FFF2-40B4-BE49-F238E27FC236}">
-                <a16:creationId xmlns:a16="http://schemas.microsoft.com/office/drawing/2014/main" id="{F917C5FA-63D8-72C9-6EB4-109F61F5F204}"/>
-              </a:ext>
-            </a:extLst>
-          </p:cNvPr>
-          <p:cNvSpPr>
-            <a:spLocks noGrp="1"/>
-          </p:cNvSpPr>
-          <p:nvPr>
-            <p:ph sz="half" idx="1"/>
-          </p:nvPr>
-        </p:nvSpPr>
-        <p:spPr>
-          <a:xfrm>
-            <a:off x="581193" y="2228003"/>
-            <a:ext cx="5422390" cy="3633047"/>
-          </a:xfrm>
-        </p:spPr>
-        <p:txBody>
-          <a:bodyPr anchor="ctr">
-            <a:normAutofit/>
-          </a:bodyPr>
-          <a:lstStyle/>
-          <a:p>
-            <a:pPr>
-              <a:buFont typeface="Arial" panose="020B0604020202020204" pitchFamily="34" charset="0"/>
-              <a:buChar char="•"/>
-            </a:pPr>
-            <a:r>
-              <a:rPr lang="en-GB" b="1" dirty="0"/>
-              <a:t>JavaScript Object Notation (JSON)</a:t>
-            </a:r>
-            <a:r>
-              <a:rPr lang="en-GB" dirty="0"/>
-              <a:t> is a lightweight format for data exchange.</a:t>
-            </a:r>
-          </a:p>
-          <a:p>
-            <a:pPr marL="742950" lvl="1" indent="-285750">
-              <a:buFont typeface="Arial" panose="020B0604020202020204" pitchFamily="34" charset="0"/>
-              <a:buChar char="•"/>
-            </a:pPr>
-            <a:r>
-              <a:rPr lang="en-GB" dirty="0"/>
-              <a:t>Syntax: key-value pairs (like JavaScript objects).</a:t>
-            </a:r>
-          </a:p>
-          <a:p>
-            <a:pPr marL="742950" lvl="1" indent="-285750">
-              <a:buFont typeface="Arial" panose="020B0604020202020204" pitchFamily="34" charset="0"/>
-              <a:buChar char="•"/>
-            </a:pPr>
-            <a:r>
-              <a:rPr lang="en-GB" dirty="0"/>
-              <a:t>Easy to read and write.</a:t>
-            </a:r>
-          </a:p>
-        </p:txBody>
-      </p:sp>
-      <p:pic>
-        <p:nvPicPr>
-          <p:cNvPr id="5" name="Picture 4" descr="A screenshot of a computer&#10;&#10;Description automatically generated">
-            <a:extLst>
-              <a:ext uri="{FF2B5EF4-FFF2-40B4-BE49-F238E27FC236}">
-                <a16:creationId xmlns:a16="http://schemas.microsoft.com/office/drawing/2014/main" id="{64810ECC-3868-FF81-8D46-E00A54DBDA1D}"/>
+                <a16:creationId xmlns:a16="http://schemas.microsoft.com/office/drawing/2014/main" id="{D1F2C34A-EB89-8218-A7D2-BE25F007CFC1}"/>
               </a:ext>
             </a:extLst>
           </p:cNvPr>
@@ -7496,15 +7556,15 @@
           <p:nvPr/>
         </p:nvPicPr>
         <p:blipFill>
-          <a:blip r:embed="rId2"/>
+          <a:blip r:embed="rId3"/>
           <a:stretch>
             <a:fillRect/>
           </a:stretch>
         </p:blipFill>
         <p:spPr>
           <a:xfrm>
-            <a:off x="7341044" y="3413051"/>
-            <a:ext cx="2273300" cy="1384300"/>
+            <a:off x="5845007" y="2654299"/>
+            <a:ext cx="5765800" cy="2705100"/>
           </a:xfrm>
           <a:prstGeom prst="rect">
             <a:avLst/>
@@ -7514,214 +7574,7 @@
     </p:spTree>
     <p:extLst>
       <p:ext uri="{BB962C8B-B14F-4D97-AF65-F5344CB8AC3E}">
-        <p14:creationId xmlns:p14="http://schemas.microsoft.com/office/powerpoint/2010/main" val="1235399654"/>
-      </p:ext>
-    </p:extLst>
-  </p:cSld>
-  <p:clrMapOvr>
-    <a:masterClrMapping/>
-  </p:clrMapOvr>
-</p:sld>
-</file>
-
-<file path=ppt/slides/slide9.xml><?xml version="1.0" encoding="utf-8"?>
-<p:sld xmlns:a="http://schemas.openxmlformats.org/drawingml/2006/main" xmlns:r="http://schemas.openxmlformats.org/officeDocument/2006/relationships" xmlns:p="http://schemas.openxmlformats.org/presentationml/2006/main">
-  <p:cSld>
-    <p:spTree>
-      <p:nvGrpSpPr>
-        <p:cNvPr id="1" name="">
-          <a:extLst>
-            <a:ext uri="{FF2B5EF4-FFF2-40B4-BE49-F238E27FC236}">
-              <a16:creationId xmlns:a16="http://schemas.microsoft.com/office/drawing/2014/main" id="{02B3D4AA-A31B-82F5-B997-94A4392F7CBC}"/>
-            </a:ext>
-          </a:extLst>
-        </p:cNvPr>
-        <p:cNvGrpSpPr/>
-        <p:nvPr/>
-      </p:nvGrpSpPr>
-      <p:grpSpPr>
-        <a:xfrm>
-          <a:off x="0" y="0"/>
-          <a:ext cx="0" cy="0"/>
-          <a:chOff x="0" y="0"/>
-          <a:chExt cx="0" cy="0"/>
-        </a:xfrm>
-      </p:grpSpPr>
-      <p:sp>
-        <p:nvSpPr>
-          <p:cNvPr id="2" name="Title 1">
-            <a:extLst>
-              <a:ext uri="{FF2B5EF4-FFF2-40B4-BE49-F238E27FC236}">
-                <a16:creationId xmlns:a16="http://schemas.microsoft.com/office/drawing/2014/main" id="{CDA66507-E397-C799-0E31-DF06E62A0751}"/>
-              </a:ext>
-            </a:extLst>
-          </p:cNvPr>
-          <p:cNvSpPr>
-            <a:spLocks noGrp="1"/>
-          </p:cNvSpPr>
-          <p:nvPr>
-            <p:ph type="title"/>
-          </p:nvPr>
-        </p:nvSpPr>
-        <p:spPr>
-          <a:xfrm>
-            <a:off x="581193" y="729658"/>
-            <a:ext cx="11029616" cy="988332"/>
-          </a:xfrm>
-        </p:spPr>
-        <p:txBody>
-          <a:bodyPr anchor="b">
-            <a:normAutofit/>
-          </a:bodyPr>
-          <a:lstStyle/>
-          <a:p>
-            <a:r>
-              <a:rPr lang="en-GB" dirty="0"/>
-              <a:t>JSON Requests with the Fetch Method</a:t>
-            </a:r>
-          </a:p>
-        </p:txBody>
-      </p:sp>
-      <p:sp>
-        <p:nvSpPr>
-          <p:cNvPr id="3" name="Content Placeholder 2">
-            <a:extLst>
-              <a:ext uri="{FF2B5EF4-FFF2-40B4-BE49-F238E27FC236}">
-                <a16:creationId xmlns:a16="http://schemas.microsoft.com/office/drawing/2014/main" id="{195F2A2C-0970-C0AC-03F0-057DD3EC67E8}"/>
-              </a:ext>
-            </a:extLst>
-          </p:cNvPr>
-          <p:cNvSpPr>
-            <a:spLocks noGrp="1"/>
-          </p:cNvSpPr>
-          <p:nvPr>
-            <p:ph sz="half" idx="1"/>
-          </p:nvPr>
-        </p:nvSpPr>
-        <p:spPr>
-          <a:xfrm>
-            <a:off x="581193" y="2228003"/>
-            <a:ext cx="5422390" cy="3633047"/>
-          </a:xfrm>
-        </p:spPr>
-        <p:txBody>
-          <a:bodyPr anchor="ctr">
-            <a:normAutofit lnSpcReduction="10000"/>
-          </a:bodyPr>
-          <a:lstStyle/>
-          <a:p>
-            <a:r>
-              <a:rPr lang="en-GB" b="1" dirty="0"/>
-              <a:t>Fetch</a:t>
-            </a:r>
-            <a:r>
-              <a:rPr lang="en-GB" dirty="0"/>
-              <a:t>: A built-in JavaScript method for making HTTP requests.</a:t>
-            </a:r>
-          </a:p>
-          <a:p>
-            <a:r>
-              <a:rPr lang="en-GB" b="1" dirty="0"/>
-              <a:t>Basic Structure</a:t>
-            </a:r>
-            <a:br>
-              <a:rPr lang="en-GB" b="1" dirty="0"/>
-            </a:br>
-            <a:br>
-              <a:rPr lang="en-GB" b="1" dirty="0"/>
-            </a:br>
-            <a:br>
-              <a:rPr lang="en-GB" b="1" dirty="0"/>
-            </a:br>
-            <a:br>
-              <a:rPr lang="en-GB" b="1" dirty="0"/>
-            </a:br>
-            <a:br>
-              <a:rPr lang="en-GB" b="1" dirty="0"/>
-            </a:br>
-            <a:endParaRPr lang="en-GB" b="1" dirty="0"/>
-          </a:p>
-          <a:p>
-            <a:pPr>
-              <a:buFont typeface="Arial" panose="020B0604020202020204" pitchFamily="34" charset="0"/>
-              <a:buChar char="•"/>
-            </a:pPr>
-            <a:r>
-              <a:rPr lang="en-GB" b="1" dirty="0"/>
-              <a:t>How it works</a:t>
-            </a:r>
-            <a:r>
-              <a:rPr lang="en-GB" dirty="0"/>
-              <a:t>:</a:t>
-            </a:r>
-          </a:p>
-          <a:p>
-            <a:pPr marL="742950" lvl="1" indent="-285750">
-              <a:buFont typeface="Arial" panose="020B0604020202020204" pitchFamily="34" charset="0"/>
-              <a:buChar char="•"/>
-            </a:pPr>
-            <a:r>
-              <a:rPr lang="en-GB" dirty="0"/>
-              <a:t>Fetch makes a request and receives a response.</a:t>
-            </a:r>
-          </a:p>
-          <a:p>
-            <a:pPr marL="742950" lvl="1" indent="-285750">
-              <a:buFont typeface="Arial" panose="020B0604020202020204" pitchFamily="34" charset="0"/>
-              <a:buChar char="•"/>
-            </a:pPr>
-            <a:r>
-              <a:rPr lang="en-GB" dirty="0"/>
-              <a:t>The .</a:t>
-            </a:r>
-            <a:r>
-              <a:rPr lang="en-GB" dirty="0" err="1"/>
-              <a:t>json</a:t>
-            </a:r>
-            <a:r>
-              <a:rPr lang="en-GB" dirty="0"/>
-              <a:t>() method parses the JSON data.</a:t>
-            </a:r>
-          </a:p>
-          <a:p>
-            <a:endParaRPr lang="en-GB" dirty="0"/>
-          </a:p>
-        </p:txBody>
-      </p:sp>
-      <p:pic>
-        <p:nvPicPr>
-          <p:cNvPr id="6" name="Picture 5" descr="A black background with white text&#10;&#10;Description automatically generated">
-            <a:extLst>
-              <a:ext uri="{FF2B5EF4-FFF2-40B4-BE49-F238E27FC236}">
-                <a16:creationId xmlns:a16="http://schemas.microsoft.com/office/drawing/2014/main" id="{C5D6F12F-D9AA-93EE-0557-26F5708F1D98}"/>
-              </a:ext>
-            </a:extLst>
-          </p:cNvPr>
-          <p:cNvPicPr>
-            <a:picLocks noChangeAspect="1"/>
-          </p:cNvPicPr>
-          <p:nvPr/>
-        </p:nvPicPr>
-        <p:blipFill>
-          <a:blip r:embed="rId2"/>
-          <a:stretch>
-            <a:fillRect/>
-          </a:stretch>
-        </p:blipFill>
-        <p:spPr>
-          <a:xfrm>
-            <a:off x="1316209" y="3269512"/>
-            <a:ext cx="4292600" cy="1041400"/>
-          </a:xfrm>
-          <a:prstGeom prst="rect">
-            <a:avLst/>
-          </a:prstGeom>
-        </p:spPr>
-      </p:pic>
-    </p:spTree>
-    <p:extLst>
-      <p:ext uri="{BB962C8B-B14F-4D97-AF65-F5344CB8AC3E}">
-        <p14:creationId xmlns:p14="http://schemas.microsoft.com/office/powerpoint/2010/main" val="1082753359"/>
+        <p14:creationId xmlns:p14="http://schemas.microsoft.com/office/powerpoint/2010/main" val="2497984633"/>
       </p:ext>
     </p:extLst>
   </p:cSld>

</xml_diff>